<commit_message>
added Jos as speaker
</commit_message>
<xml_diff>
--- a/resources/LangDev Talk.pptx
+++ b/resources/LangDev Talk.pptx
@@ -5,7 +5,7 @@
     <p:sldMasterId id="2147483659" r:id="rId1"/>
   </p:sldMasterIdLst>
   <p:notesMasterIdLst>
-    <p:notesMasterId r:id="rId21"/>
+    <p:notesMasterId r:id="rId22"/>
   </p:notesMasterIdLst>
   <p:sldIdLst>
     <p:sldId id="266" r:id="rId2"/>
@@ -25,25 +25,26 @@
     <p:sldId id="273" r:id="rId16"/>
     <p:sldId id="276" r:id="rId17"/>
     <p:sldId id="277" r:id="rId18"/>
-    <p:sldId id="263" r:id="rId19"/>
-    <p:sldId id="265" r:id="rId20"/>
+    <p:sldId id="285" r:id="rId19"/>
+    <p:sldId id="263" r:id="rId20"/>
+    <p:sldId id="265" r:id="rId21"/>
   </p:sldIdLst>
   <p:sldSz cx="9144000" cy="5143500" type="screen16x9"/>
   <p:notesSz cx="6858000" cy="9144000"/>
   <p:embeddedFontLst>
     <p:embeddedFont>
       <p:font typeface="Calibri" panose="020F0502020204030204" pitchFamily="34" charset="0"/>
-      <p:regular r:id="rId22"/>
-      <p:bold r:id="rId23"/>
-      <p:italic r:id="rId24"/>
-      <p:boldItalic r:id="rId25"/>
+      <p:regular r:id="rId23"/>
+      <p:bold r:id="rId24"/>
+      <p:italic r:id="rId25"/>
+      <p:boldItalic r:id="rId26"/>
     </p:embeddedFont>
     <p:embeddedFont>
       <p:font typeface="Roboto Mono" panose="020B0604020202020204" charset="0"/>
-      <p:regular r:id="rId26"/>
-      <p:bold r:id="rId27"/>
-      <p:italic r:id="rId28"/>
-      <p:boldItalic r:id="rId29"/>
+      <p:regular r:id="rId27"/>
+      <p:bold r:id="rId28"/>
+      <p:italic r:id="rId29"/>
+      <p:boldItalic r:id="rId30"/>
     </p:embeddedFont>
   </p:embeddedFontLst>
   <p:defaultTextStyle>
@@ -6597,7 +6598,7 @@
           <a:p>
             <a:r>
               <a:rPr lang="en-US" dirty="0"/>
-              <a:t>Niko Stotz</a:t>
+              <a:t>Jos Warmer, Niko Stotz</a:t>
             </a:r>
           </a:p>
         </p:txBody>
@@ -43502,6 +43503,64 @@
   <p:cSld>
     <p:spTree>
       <p:nvGrpSpPr>
+        <p:cNvPr id="1" name=""/>
+        <p:cNvGrpSpPr/>
+        <p:nvPr/>
+      </p:nvGrpSpPr>
+      <p:grpSpPr>
+        <a:xfrm>
+          <a:off x="0" y="0"/>
+          <a:ext cx="0" cy="0"/>
+          <a:chOff x="0" y="0"/>
+          <a:chExt cx="0" cy="0"/>
+        </a:xfrm>
+      </p:grpSpPr>
+      <p:sp>
+        <p:nvSpPr>
+          <p:cNvPr id="2" name="Title 1">
+            <a:extLst>
+              <a:ext uri="{FF2B5EF4-FFF2-40B4-BE49-F238E27FC236}">
+                <a16:creationId xmlns:a16="http://schemas.microsoft.com/office/drawing/2014/main" id="{34C88B79-BA75-78DC-A792-DA9A01CB353F}"/>
+              </a:ext>
+            </a:extLst>
+          </p:cNvPr>
+          <p:cNvSpPr>
+            <a:spLocks noGrp="1"/>
+          </p:cNvSpPr>
+          <p:nvPr>
+            <p:ph type="title"/>
+          </p:nvPr>
+        </p:nvSpPr>
+        <p:spPr/>
+        <p:txBody>
+          <a:bodyPr/>
+          <a:lstStyle/>
+          <a:p>
+            <a:r>
+              <a:rPr lang="en-US" dirty="0"/>
+              <a:t>Leftovers</a:t>
+            </a:r>
+          </a:p>
+        </p:txBody>
+      </p:sp>
+    </p:spTree>
+    <p:extLst>
+      <p:ext uri="{BB962C8B-B14F-4D97-AF65-F5344CB8AC3E}">
+        <p14:creationId xmlns:p14="http://schemas.microsoft.com/office/powerpoint/2010/main" val="3613368073"/>
+      </p:ext>
+    </p:extLst>
+  </p:cSld>
+  <p:clrMapOvr>
+    <a:masterClrMapping/>
+  </p:clrMapOvr>
+</p:sld>
+</file>
+
+<file path=ppt/slides/slide19.xml><?xml version="1.0" encoding="utf-8"?>
+<p:sld xmlns:a="http://schemas.openxmlformats.org/drawingml/2006/main" xmlns:r="http://schemas.openxmlformats.org/officeDocument/2006/relationships" xmlns:p="http://schemas.openxmlformats.org/presentationml/2006/main">
+  <p:cSld>
+    <p:spTree>
+      <p:nvGrpSpPr>
         <p:cNvPr id="1" name="Shape 177"/>
         <p:cNvGrpSpPr/>
         <p:nvPr/>
@@ -43917,7 +43976,65 @@
 </p:sld>
 </file>
 
-<file path=ppt/slides/slide19.xml><?xml version="1.0" encoding="utf-8"?>
+<file path=ppt/slides/slide2.xml><?xml version="1.0" encoding="utf-8"?>
+<p:sld xmlns:a="http://schemas.openxmlformats.org/drawingml/2006/main" xmlns:r="http://schemas.openxmlformats.org/officeDocument/2006/relationships" xmlns:p="http://schemas.openxmlformats.org/presentationml/2006/main">
+  <p:cSld>
+    <p:spTree>
+      <p:nvGrpSpPr>
+        <p:cNvPr id="1" name=""/>
+        <p:cNvGrpSpPr/>
+        <p:nvPr/>
+      </p:nvGrpSpPr>
+      <p:grpSpPr>
+        <a:xfrm>
+          <a:off x="0" y="0"/>
+          <a:ext cx="0" cy="0"/>
+          <a:chOff x="0" y="0"/>
+          <a:chExt cx="0" cy="0"/>
+        </a:xfrm>
+      </p:grpSpPr>
+      <p:sp>
+        <p:nvSpPr>
+          <p:cNvPr id="3" name="Title 2">
+            <a:extLst>
+              <a:ext uri="{FF2B5EF4-FFF2-40B4-BE49-F238E27FC236}">
+                <a16:creationId xmlns:a16="http://schemas.microsoft.com/office/drawing/2014/main" id="{ED1CB88A-BB8F-4F89-3FF6-B591EA38D3F6}"/>
+              </a:ext>
+            </a:extLst>
+          </p:cNvPr>
+          <p:cNvSpPr>
+            <a:spLocks noGrp="1"/>
+          </p:cNvSpPr>
+          <p:nvPr>
+            <p:ph type="title"/>
+          </p:nvPr>
+        </p:nvSpPr>
+        <p:spPr/>
+        <p:txBody>
+          <a:bodyPr/>
+          <a:lstStyle/>
+          <a:p>
+            <a:r>
+              <a:rPr lang="en-US" dirty="0"/>
+              <a:t>Project Overview</a:t>
+            </a:r>
+          </a:p>
+        </p:txBody>
+      </p:sp>
+    </p:spTree>
+    <p:extLst>
+      <p:ext uri="{BB962C8B-B14F-4D97-AF65-F5344CB8AC3E}">
+        <p14:creationId xmlns:p14="http://schemas.microsoft.com/office/powerpoint/2010/main" val="3239961873"/>
+      </p:ext>
+    </p:extLst>
+  </p:cSld>
+  <p:clrMapOvr>
+    <a:masterClrMapping/>
+  </p:clrMapOvr>
+</p:sld>
+</file>
+
+<file path=ppt/slides/slide20.xml><?xml version="1.0" encoding="utf-8"?>
 <p:sld xmlns:a="http://schemas.openxmlformats.org/drawingml/2006/main" xmlns:r="http://schemas.openxmlformats.org/officeDocument/2006/relationships" xmlns:p="http://schemas.openxmlformats.org/presentationml/2006/main">
   <p:cSld>
     <p:spTree>
@@ -44410,64 +44527,6 @@
         </p:txBody>
       </p:sp>
     </p:spTree>
-  </p:cSld>
-  <p:clrMapOvr>
-    <a:masterClrMapping/>
-  </p:clrMapOvr>
-</p:sld>
-</file>
-
-<file path=ppt/slides/slide2.xml><?xml version="1.0" encoding="utf-8"?>
-<p:sld xmlns:a="http://schemas.openxmlformats.org/drawingml/2006/main" xmlns:r="http://schemas.openxmlformats.org/officeDocument/2006/relationships" xmlns:p="http://schemas.openxmlformats.org/presentationml/2006/main">
-  <p:cSld>
-    <p:spTree>
-      <p:nvGrpSpPr>
-        <p:cNvPr id="1" name=""/>
-        <p:cNvGrpSpPr/>
-        <p:nvPr/>
-      </p:nvGrpSpPr>
-      <p:grpSpPr>
-        <a:xfrm>
-          <a:off x="0" y="0"/>
-          <a:ext cx="0" cy="0"/>
-          <a:chOff x="0" y="0"/>
-          <a:chExt cx="0" cy="0"/>
-        </a:xfrm>
-      </p:grpSpPr>
-      <p:sp>
-        <p:nvSpPr>
-          <p:cNvPr id="3" name="Title 2">
-            <a:extLst>
-              <a:ext uri="{FF2B5EF4-FFF2-40B4-BE49-F238E27FC236}">
-                <a16:creationId xmlns:a16="http://schemas.microsoft.com/office/drawing/2014/main" id="{ED1CB88A-BB8F-4F89-3FF6-B591EA38D3F6}"/>
-              </a:ext>
-            </a:extLst>
-          </p:cNvPr>
-          <p:cNvSpPr>
-            <a:spLocks noGrp="1"/>
-          </p:cNvSpPr>
-          <p:nvPr>
-            <p:ph type="title"/>
-          </p:nvPr>
-        </p:nvSpPr>
-        <p:spPr/>
-        <p:txBody>
-          <a:bodyPr/>
-          <a:lstStyle/>
-          <a:p>
-            <a:r>
-              <a:rPr lang="en-US" dirty="0"/>
-              <a:t>Project Overview</a:t>
-            </a:r>
-          </a:p>
-        </p:txBody>
-      </p:sp>
-    </p:spTree>
-    <p:extLst>
-      <p:ext uri="{BB962C8B-B14F-4D97-AF65-F5344CB8AC3E}">
-        <p14:creationId xmlns:p14="http://schemas.microsoft.com/office/powerpoint/2010/main" val="3239961873"/>
-      </p:ext>
-    </p:extLst>
   </p:cSld>
   <p:clrMapOvr>
     <a:masterClrMapping/>

</xml_diff>

<commit_message>
adjusted demo intro slides to my understanding (to be discussed)
</commit_message>
<xml_diff>
--- a/resources/LangDev Talk.pptx
+++ b/resources/LangDev Talk.pptx
@@ -23040,11 +23040,14 @@
           <a:p>
             <a:pPr algn="ctr"/>
             <a:r>
-              <a:rPr lang="en-NL" sz="1200" dirty="0">
+              <a:rPr lang="en-US" sz="1200" dirty="0">
                 <a:latin typeface="Gill Sans MT" panose="020B0502020104020203" pitchFamily="34" charset="77"/>
               </a:rPr>
-              <a:t>Freon Editor for LionWeb MetaModels</a:t>
+              <a:t>Using MPS to create PROP language</a:t>
             </a:r>
+            <a:endParaRPr lang="en-NL" sz="1200" dirty="0">
+              <a:latin typeface="Gill Sans MT" panose="020B0502020104020203" pitchFamily="34" charset="77"/>
+            </a:endParaRPr>
           </a:p>
         </p:txBody>
       </p:sp>
@@ -24470,6 +24473,63 @@
           </a:fontRef>
         </p:style>
       </p:cxnSp>
+      <p:sp>
+        <p:nvSpPr>
+          <p:cNvPr id="2" name="Rectangle 1">
+            <a:extLst>
+              <a:ext uri="{FF2B5EF4-FFF2-40B4-BE49-F238E27FC236}">
+                <a16:creationId xmlns:a16="http://schemas.microsoft.com/office/drawing/2014/main" id="{83159B6E-E6DF-97A5-7481-DEA907FB9AD3}"/>
+              </a:ext>
+            </a:extLst>
+          </p:cNvPr>
+          <p:cNvSpPr/>
+          <p:nvPr/>
+        </p:nvSpPr>
+        <p:spPr>
+          <a:xfrm>
+            <a:off x="2743200" y="2069925"/>
+            <a:ext cx="1819208" cy="2755727"/>
+          </a:xfrm>
+          <a:prstGeom prst="rect">
+            <a:avLst/>
+          </a:prstGeom>
+          <a:solidFill>
+            <a:schemeClr val="lt1">
+              <a:alpha val="67000"/>
+            </a:schemeClr>
+          </a:solidFill>
+          <a:ln w="12700">
+            <a:solidFill>
+              <a:srgbClr val="B3CEFB"/>
+            </a:solidFill>
+            <a:prstDash val="dash"/>
+          </a:ln>
+        </p:spPr>
+        <p:style>
+          <a:lnRef idx="2">
+            <a:schemeClr val="accent1">
+              <a:shade val="15000"/>
+            </a:schemeClr>
+          </a:lnRef>
+          <a:fillRef idx="1">
+            <a:schemeClr val="accent1"/>
+          </a:fillRef>
+          <a:effectRef idx="0">
+            <a:schemeClr val="accent1"/>
+          </a:effectRef>
+          <a:fontRef idx="minor">
+            <a:schemeClr val="lt1"/>
+          </a:fontRef>
+        </p:style>
+        <p:txBody>
+          <a:bodyPr rtlCol="0" anchor="ctr"/>
+          <a:lstStyle/>
+          <a:p>
+            <a:pPr algn="ctr"/>
+            <a:endParaRPr lang="en-NL"/>
+          </a:p>
+        </p:txBody>
+      </p:sp>
     </p:spTree>
     <p:extLst>
       <p:ext uri="{BB962C8B-B14F-4D97-AF65-F5344CB8AC3E}">
@@ -24632,7 +24692,7 @@
         </p:nvSpPr>
         <p:spPr>
           <a:xfrm>
-            <a:off x="3275585" y="2016355"/>
+            <a:off x="3272453" y="2016355"/>
             <a:ext cx="1283251" cy="603294"/>
           </a:xfrm>
           <a:prstGeom prst="flowChartDocument">
@@ -24880,9 +24940,9 @@
           <p:nvPr/>
         </p:nvCxnSpPr>
         <p:spPr>
-          <a:xfrm rot="16200000" flipH="1">
-            <a:off x="3542057" y="1641201"/>
-            <a:ext cx="747734" cy="2573"/>
+          <a:xfrm rot="5400000">
+            <a:off x="3540492" y="1642209"/>
+            <a:ext cx="747734" cy="559"/>
           </a:xfrm>
           <a:prstGeom prst="bentConnector3">
             <a:avLst>
@@ -24930,9 +24990,9 @@
           <p:nvPr/>
         </p:nvCxnSpPr>
         <p:spPr>
-          <a:xfrm rot="5400000">
-            <a:off x="3556537" y="2937867"/>
-            <a:ext cx="718776" cy="2572"/>
+          <a:xfrm rot="16200000" flipH="1">
+            <a:off x="3554971" y="2938873"/>
+            <a:ext cx="718776" cy="560"/>
           </a:xfrm>
           <a:prstGeom prst="bentConnector3">
             <a:avLst>
@@ -25451,14 +25511,20 @@
           <a:lstStyle/>
           <a:p>
             <a:r>
-              <a:rPr lang="en-NL" sz="1200" dirty="0">
+              <a:rPr lang="en-US" sz="1200" dirty="0">
                 <a:solidFill>
                   <a:srgbClr val="00B050"/>
                 </a:solidFill>
                 <a:latin typeface="Gill Sans MT" panose="020B0502020104020203" pitchFamily="34" charset="77"/>
               </a:rPr>
-              <a:t>6</a:t>
+              <a:t>4</a:t>
             </a:r>
+            <a:endParaRPr lang="en-NL" sz="1200" dirty="0">
+              <a:solidFill>
+                <a:srgbClr val="00B050"/>
+              </a:solidFill>
+              <a:latin typeface="Gill Sans MT" panose="020B0502020104020203" pitchFamily="34" charset="77"/>
+            </a:endParaRPr>
           </a:p>
         </p:txBody>
       </p:sp>
@@ -25491,14 +25557,20 @@
           <a:lstStyle/>
           <a:p>
             <a:r>
-              <a:rPr lang="en-NL" sz="1200" dirty="0">
+              <a:rPr lang="en-US" sz="1200" dirty="0">
                 <a:solidFill>
                   <a:srgbClr val="00B050"/>
                 </a:solidFill>
                 <a:latin typeface="Gill Sans MT" panose="020B0502020104020203" pitchFamily="34" charset="77"/>
               </a:rPr>
-              <a:t>5</a:t>
+              <a:t>6</a:t>
             </a:r>
+            <a:endParaRPr lang="en-NL" sz="1200" dirty="0">
+              <a:solidFill>
+                <a:srgbClr val="00B050"/>
+              </a:solidFill>
+              <a:latin typeface="Gill Sans MT" panose="020B0502020104020203" pitchFamily="34" charset="77"/>
+            </a:endParaRPr>
           </a:p>
         </p:txBody>
       </p:sp>
@@ -25517,7 +25589,7 @@
         <p:spPr>
           <a:xfrm>
             <a:off x="4913507" y="3340630"/>
-            <a:ext cx="269626" cy="276999"/>
+            <a:ext cx="261610" cy="276999"/>
           </a:xfrm>
           <a:prstGeom prst="rect">
             <a:avLst/>
@@ -25531,14 +25603,20 @@
           <a:lstStyle/>
           <a:p>
             <a:r>
-              <a:rPr lang="en-NL" sz="1200" dirty="0">
+              <a:rPr lang="en-US" sz="1200" dirty="0">
                 <a:solidFill>
                   <a:srgbClr val="00B050"/>
                 </a:solidFill>
                 <a:latin typeface="Gill Sans MT" panose="020B0502020104020203" pitchFamily="34" charset="77"/>
               </a:rPr>
-              <a:t>4</a:t>
+              <a:t>5</a:t>
             </a:r>
+            <a:endParaRPr lang="en-NL" sz="1200" dirty="0">
+              <a:solidFill>
+                <a:srgbClr val="00B050"/>
+              </a:solidFill>
+              <a:latin typeface="Gill Sans MT" panose="020B0502020104020203" pitchFamily="34" charset="77"/>
+            </a:endParaRPr>
           </a:p>
         </p:txBody>
       </p:sp>
@@ -25636,8 +25714,29 @@
               <a:rPr lang="en-NL" sz="1200" dirty="0">
                 <a:latin typeface="Gill Sans MT" panose="020B0502020104020203" pitchFamily="34" charset="77"/>
               </a:rPr>
-              <a:t>Ecore PROP language</a:t>
+              <a:t>E</a:t>
             </a:r>
+            <a:r>
+              <a:rPr lang="en-US" sz="1200" dirty="0">
+                <a:latin typeface="Gill Sans MT" panose="020B0502020104020203" pitchFamily="34" charset="77"/>
+              </a:rPr>
+              <a:t>MF</a:t>
+            </a:r>
+            <a:r>
+              <a:rPr lang="en-NL" sz="1200" dirty="0">
+                <a:latin typeface="Gill Sans MT" panose="020B0502020104020203" pitchFamily="34" charset="77"/>
+              </a:rPr>
+              <a:t> PROP </a:t>
+            </a:r>
+            <a:r>
+              <a:rPr lang="en-US" sz="1200" dirty="0">
+                <a:latin typeface="Gill Sans MT" panose="020B0502020104020203" pitchFamily="34" charset="77"/>
+              </a:rPr>
+              <a:t>instance</a:t>
+            </a:r>
+            <a:endParaRPr lang="en-NL" sz="1200" dirty="0">
+              <a:latin typeface="Gill Sans MT" panose="020B0502020104020203" pitchFamily="34" charset="77"/>
+            </a:endParaRPr>
           </a:p>
         </p:txBody>
       </p:sp>

</xml_diff>

<commit_message>
SVG of metametemodel in LangDev slides
</commit_message>
<xml_diff>
--- a/resources/LangDev Talk.pptx
+++ b/resources/LangDev Talk.pptx
@@ -5,7 +5,7 @@
     <p:sldMasterId id="2147483659" r:id="rId1"/>
   </p:sldMasterIdLst>
   <p:notesMasterIdLst>
-    <p:notesMasterId r:id="rId21"/>
+    <p:notesMasterId r:id="rId20"/>
   </p:notesMasterIdLst>
   <p:sldIdLst>
     <p:sldId id="266" r:id="rId2"/>
@@ -19,35 +19,34 @@
     <p:sldId id="294" r:id="rId10"/>
     <p:sldId id="295" r:id="rId11"/>
     <p:sldId id="296" r:id="rId12"/>
-    <p:sldId id="293" r:id="rId13"/>
-    <p:sldId id="277" r:id="rId14"/>
-    <p:sldId id="285" r:id="rId15"/>
-    <p:sldId id="292" r:id="rId16"/>
-    <p:sldId id="290" r:id="rId17"/>
-    <p:sldId id="263" r:id="rId18"/>
-    <p:sldId id="287" r:id="rId19"/>
-    <p:sldId id="265" r:id="rId20"/>
+    <p:sldId id="277" r:id="rId13"/>
+    <p:sldId id="285" r:id="rId14"/>
+    <p:sldId id="292" r:id="rId15"/>
+    <p:sldId id="290" r:id="rId16"/>
+    <p:sldId id="263" r:id="rId17"/>
+    <p:sldId id="287" r:id="rId18"/>
+    <p:sldId id="265" r:id="rId19"/>
   </p:sldIdLst>
   <p:sldSz cx="9144000" cy="5143500" type="screen16x9"/>
   <p:notesSz cx="6858000" cy="9144000"/>
   <p:embeddedFontLst>
     <p:embeddedFont>
       <p:font typeface="Bauhaus 93"/>
-      <p:regular r:id="rId22"/>
+      <p:regular r:id="rId21"/>
     </p:embeddedFont>
     <p:embeddedFont>
       <p:font typeface="Calibri" panose="020F0502020204030204" pitchFamily="34" charset="0"/>
-      <p:regular r:id="rId23"/>
-      <p:bold r:id="rId24"/>
-      <p:italic r:id="rId25"/>
-      <p:boldItalic r:id="rId26"/>
+      <p:regular r:id="rId22"/>
+      <p:bold r:id="rId23"/>
+      <p:italic r:id="rId24"/>
+      <p:boldItalic r:id="rId25"/>
     </p:embeddedFont>
     <p:embeddedFont>
       <p:font typeface="Gill Sans MT" panose="020B0502020104020203" pitchFamily="34" charset="77"/>
-      <p:regular r:id="rId27"/>
-      <p:bold r:id="rId28"/>
-      <p:italic r:id="rId29"/>
-      <p:boldItalic r:id="rId30"/>
+      <p:regular r:id="rId26"/>
+      <p:bold r:id="rId27"/>
+      <p:italic r:id="rId28"/>
+      <p:boldItalic r:id="rId29"/>
     </p:embeddedFont>
   </p:embeddedFontLst>
   <p:defaultTextStyle>
@@ -15006,963 +15005,6 @@
       </p:grpSp>
       <p:grpSp>
         <p:nvGrpSpPr>
-          <p:cNvPr id="446" name="Graphic 4">
-            <a:extLst>
-              <a:ext uri="{FF2B5EF4-FFF2-40B4-BE49-F238E27FC236}">
-                <a16:creationId xmlns:a16="http://schemas.microsoft.com/office/drawing/2014/main" id="{DDBEC61F-C861-E656-B72D-850B5BBB81BE}"/>
-              </a:ext>
-            </a:extLst>
-          </p:cNvPr>
-          <p:cNvGrpSpPr/>
-          <p:nvPr/>
-        </p:nvGrpSpPr>
-        <p:grpSpPr>
-          <a:xfrm>
-            <a:off x="6554148" y="1954222"/>
-            <a:ext cx="437299" cy="428715"/>
-            <a:chOff x="7095019" y="2931506"/>
-            <a:chExt cx="720584" cy="720584"/>
-          </a:xfrm>
-        </p:grpSpPr>
-        <p:sp>
-          <p:nvSpPr>
-            <p:cNvPr id="476" name="Freeform: Shape 475">
-              <a:extLst>
-                <a:ext uri="{FF2B5EF4-FFF2-40B4-BE49-F238E27FC236}">
-                  <a16:creationId xmlns:a16="http://schemas.microsoft.com/office/drawing/2014/main" id="{0F55368D-369C-7867-5AA7-B5CDC343A781}"/>
-                </a:ext>
-              </a:extLst>
-            </p:cNvPr>
-            <p:cNvSpPr/>
-            <p:nvPr/>
-          </p:nvSpPr>
-          <p:spPr>
-            <a:xfrm>
-              <a:off x="7256777" y="3093265"/>
-              <a:ext cx="397067" cy="397066"/>
-            </a:xfrm>
-            <a:custGeom>
-              <a:avLst/>
-              <a:gdLst>
-                <a:gd name="connsiteX0" fmla="*/ 396881 w 397067"/>
-                <a:gd name="connsiteY0" fmla="*/ 198506 h 397066"/>
-                <a:gd name="connsiteX1" fmla="*/ 198348 w 397067"/>
-                <a:gd name="connsiteY1" fmla="*/ 397040 h 397066"/>
-                <a:gd name="connsiteX2" fmla="*/ -186 w 397067"/>
-                <a:gd name="connsiteY2" fmla="*/ 198506 h 397066"/>
-                <a:gd name="connsiteX3" fmla="*/ 198348 w 397067"/>
-                <a:gd name="connsiteY3" fmla="*/ -27 h 397066"/>
-                <a:gd name="connsiteX4" fmla="*/ 396881 w 397067"/>
-                <a:gd name="connsiteY4" fmla="*/ 198506 h 397066"/>
-              </a:gdLst>
-              <a:ahLst/>
-              <a:cxnLst>
-                <a:cxn ang="0">
-                  <a:pos x="connsiteX0" y="connsiteY0"/>
-                </a:cxn>
-                <a:cxn ang="0">
-                  <a:pos x="connsiteX1" y="connsiteY1"/>
-                </a:cxn>
-                <a:cxn ang="0">
-                  <a:pos x="connsiteX2" y="connsiteY2"/>
-                </a:cxn>
-                <a:cxn ang="0">
-                  <a:pos x="connsiteX3" y="connsiteY3"/>
-                </a:cxn>
-                <a:cxn ang="0">
-                  <a:pos x="connsiteX4" y="connsiteY4"/>
-                </a:cxn>
-              </a:cxnLst>
-              <a:rect l="l" t="t" r="r" b="b"/>
-              <a:pathLst>
-                <a:path w="397067" h="397066">
-                  <a:moveTo>
-                    <a:pt x="396881" y="198506"/>
-                  </a:moveTo>
-                  <a:cubicBezTo>
-                    <a:pt x="396881" y="308155"/>
-                    <a:pt x="307997" y="397040"/>
-                    <a:pt x="198348" y="397040"/>
-                  </a:cubicBezTo>
-                  <a:cubicBezTo>
-                    <a:pt x="88698" y="397040"/>
-                    <a:pt x="-186" y="308155"/>
-                    <a:pt x="-186" y="198506"/>
-                  </a:cubicBezTo>
-                  <a:cubicBezTo>
-                    <a:pt x="-186" y="88857"/>
-                    <a:pt x="88698" y="-27"/>
-                    <a:pt x="198348" y="-27"/>
-                  </a:cubicBezTo>
-                  <a:cubicBezTo>
-                    <a:pt x="307997" y="-27"/>
-                    <a:pt x="396881" y="88857"/>
-                    <a:pt x="396881" y="198506"/>
-                  </a:cubicBezTo>
-                  <a:close/>
-                </a:path>
-              </a:pathLst>
-            </a:custGeom>
-            <a:noFill/>
-            <a:ln w="69046" cap="rnd">
-              <a:solidFill>
-                <a:srgbClr val="727272"/>
-              </a:solidFill>
-              <a:prstDash val="solid"/>
-              <a:miter/>
-            </a:ln>
-          </p:spPr>
-          <p:txBody>
-            <a:bodyPr rtlCol="0" anchor="ctr"/>
-            <a:lstStyle/>
-            <a:p>
-              <a:endParaRPr lang="en-US">
-                <a:latin typeface="Gill Sans MT" panose="020B0502020104020203" pitchFamily="34" charset="77"/>
-              </a:endParaRPr>
-            </a:p>
-          </p:txBody>
-        </p:sp>
-        <p:sp>
-          <p:nvSpPr>
-            <p:cNvPr id="477" name="Freeform: Shape 476">
-              <a:extLst>
-                <a:ext uri="{FF2B5EF4-FFF2-40B4-BE49-F238E27FC236}">
-                  <a16:creationId xmlns:a16="http://schemas.microsoft.com/office/drawing/2014/main" id="{507D2EDE-D2B4-0C28-C9BC-0206149366C2}"/>
-                </a:ext>
-              </a:extLst>
-            </p:cNvPr>
-            <p:cNvSpPr/>
-            <p:nvPr/>
-          </p:nvSpPr>
-          <p:spPr>
-            <a:xfrm>
-              <a:off x="7368555" y="3206713"/>
-              <a:ext cx="173510" cy="173510"/>
-            </a:xfrm>
-            <a:custGeom>
-              <a:avLst/>
-              <a:gdLst>
-                <a:gd name="connsiteX0" fmla="*/ 173325 w 173510"/>
-                <a:gd name="connsiteY0" fmla="*/ 86728 h 173510"/>
-                <a:gd name="connsiteX1" fmla="*/ 86569 w 173510"/>
-                <a:gd name="connsiteY1" fmla="*/ 173484 h 173510"/>
-                <a:gd name="connsiteX2" fmla="*/ -186 w 173510"/>
-                <a:gd name="connsiteY2" fmla="*/ 86728 h 173510"/>
-                <a:gd name="connsiteX3" fmla="*/ 86569 w 173510"/>
-                <a:gd name="connsiteY3" fmla="*/ -27 h 173510"/>
-                <a:gd name="connsiteX4" fmla="*/ 173325 w 173510"/>
-                <a:gd name="connsiteY4" fmla="*/ 86728 h 173510"/>
-              </a:gdLst>
-              <a:ahLst/>
-              <a:cxnLst>
-                <a:cxn ang="0">
-                  <a:pos x="connsiteX0" y="connsiteY0"/>
-                </a:cxn>
-                <a:cxn ang="0">
-                  <a:pos x="connsiteX1" y="connsiteY1"/>
-                </a:cxn>
-                <a:cxn ang="0">
-                  <a:pos x="connsiteX2" y="connsiteY2"/>
-                </a:cxn>
-                <a:cxn ang="0">
-                  <a:pos x="connsiteX3" y="connsiteY3"/>
-                </a:cxn>
-                <a:cxn ang="0">
-                  <a:pos x="connsiteX4" y="connsiteY4"/>
-                </a:cxn>
-              </a:cxnLst>
-              <a:rect l="l" t="t" r="r" b="b"/>
-              <a:pathLst>
-                <a:path w="173510" h="173510">
-                  <a:moveTo>
-                    <a:pt x="173325" y="86728"/>
-                  </a:moveTo>
-                  <a:cubicBezTo>
-                    <a:pt x="173325" y="134645"/>
-                    <a:pt x="134486" y="173484"/>
-                    <a:pt x="86569" y="173484"/>
-                  </a:cubicBezTo>
-                  <a:cubicBezTo>
-                    <a:pt x="38653" y="173484"/>
-                    <a:pt x="-186" y="134645"/>
-                    <a:pt x="-186" y="86728"/>
-                  </a:cubicBezTo>
-                  <a:cubicBezTo>
-                    <a:pt x="-186" y="38812"/>
-                    <a:pt x="38653" y="-27"/>
-                    <a:pt x="86569" y="-27"/>
-                  </a:cubicBezTo>
-                  <a:cubicBezTo>
-                    <a:pt x="134486" y="-27"/>
-                    <a:pt x="173325" y="38812"/>
-                    <a:pt x="173325" y="86728"/>
-                  </a:cubicBezTo>
-                  <a:close/>
-                </a:path>
-              </a:pathLst>
-            </a:custGeom>
-            <a:solidFill>
-              <a:srgbClr val="727272"/>
-            </a:solidFill>
-            <a:ln w="8032" cap="flat">
-              <a:noFill/>
-              <a:prstDash val="solid"/>
-              <a:miter/>
-            </a:ln>
-          </p:spPr>
-          <p:txBody>
-            <a:bodyPr rtlCol="0" anchor="ctr"/>
-            <a:lstStyle/>
-            <a:p>
-              <a:endParaRPr lang="en-US">
-                <a:latin typeface="Gill Sans MT" panose="020B0502020104020203" pitchFamily="34" charset="77"/>
-              </a:endParaRPr>
-            </a:p>
-          </p:txBody>
-        </p:sp>
-        <p:sp>
-          <p:nvSpPr>
-            <p:cNvPr id="478" name="Freeform: Shape 477">
-              <a:extLst>
-                <a:ext uri="{FF2B5EF4-FFF2-40B4-BE49-F238E27FC236}">
-                  <a16:creationId xmlns:a16="http://schemas.microsoft.com/office/drawing/2014/main" id="{52820AD1-1CCC-EBBC-BC79-5BD3E6B9DA79}"/>
-                </a:ext>
-              </a:extLst>
-            </p:cNvPr>
-            <p:cNvSpPr/>
-            <p:nvPr/>
-          </p:nvSpPr>
-          <p:spPr>
-            <a:xfrm>
-              <a:off x="7304324" y="2987688"/>
-              <a:ext cx="128462" cy="128446"/>
-            </a:xfrm>
-            <a:custGeom>
-              <a:avLst/>
-              <a:gdLst>
-                <a:gd name="connsiteX0" fmla="*/ -186 w 128462"/>
-                <a:gd name="connsiteY0" fmla="*/ 24963 h 128446"/>
-                <a:gd name="connsiteX1" fmla="*/ 60150 w 128462"/>
-                <a:gd name="connsiteY1" fmla="*/ -27 h 128446"/>
-                <a:gd name="connsiteX2" fmla="*/ 128276 w 128462"/>
-                <a:gd name="connsiteY2" fmla="*/ 78149 h 128446"/>
-                <a:gd name="connsiteX3" fmla="*/ 6915 w 128462"/>
-                <a:gd name="connsiteY3" fmla="*/ 128419 h 128446"/>
-              </a:gdLst>
-              <a:ahLst/>
-              <a:cxnLst>
-                <a:cxn ang="0">
-                  <a:pos x="connsiteX0" y="connsiteY0"/>
-                </a:cxn>
-                <a:cxn ang="0">
-                  <a:pos x="connsiteX1" y="connsiteY1"/>
-                </a:cxn>
-                <a:cxn ang="0">
-                  <a:pos x="connsiteX2" y="connsiteY2"/>
-                </a:cxn>
-                <a:cxn ang="0">
-                  <a:pos x="connsiteX3" y="connsiteY3"/>
-                </a:cxn>
-              </a:cxnLst>
-              <a:rect l="l" t="t" r="r" b="b"/>
-              <a:pathLst>
-                <a:path w="128462" h="128446">
-                  <a:moveTo>
-                    <a:pt x="-186" y="24963"/>
-                  </a:moveTo>
-                  <a:lnTo>
-                    <a:pt x="60150" y="-27"/>
-                  </a:lnTo>
-                  <a:lnTo>
-                    <a:pt x="128276" y="78149"/>
-                  </a:lnTo>
-                  <a:lnTo>
-                    <a:pt x="6915" y="128419"/>
-                  </a:lnTo>
-                  <a:close/>
-                </a:path>
-              </a:pathLst>
-            </a:custGeom>
-            <a:solidFill>
-              <a:srgbClr val="727272"/>
-            </a:solidFill>
-            <a:ln w="8032" cap="flat">
-              <a:noFill/>
-              <a:prstDash val="solid"/>
-              <a:miter/>
-            </a:ln>
-          </p:spPr>
-          <p:txBody>
-            <a:bodyPr rtlCol="0" anchor="ctr"/>
-            <a:lstStyle/>
-            <a:p>
-              <a:endParaRPr lang="en-US">
-                <a:latin typeface="Gill Sans MT" panose="020B0502020104020203" pitchFamily="34" charset="77"/>
-              </a:endParaRPr>
-            </a:p>
-          </p:txBody>
-        </p:sp>
-        <p:sp>
-          <p:nvSpPr>
-            <p:cNvPr id="479" name="Freeform: Shape 478">
-              <a:extLst>
-                <a:ext uri="{FF2B5EF4-FFF2-40B4-BE49-F238E27FC236}">
-                  <a16:creationId xmlns:a16="http://schemas.microsoft.com/office/drawing/2014/main" id="{AD30DC12-E305-E617-DA02-61DAEA3025D9}"/>
-                </a:ext>
-              </a:extLst>
-            </p:cNvPr>
-            <p:cNvSpPr/>
-            <p:nvPr/>
-          </p:nvSpPr>
-          <p:spPr>
-            <a:xfrm>
-              <a:off x="7480510" y="2987688"/>
-              <a:ext cx="128470" cy="128446"/>
-            </a:xfrm>
-            <a:custGeom>
-              <a:avLst/>
-              <a:gdLst>
-                <a:gd name="connsiteX0" fmla="*/ 67941 w 128470"/>
-                <a:gd name="connsiteY0" fmla="*/ -27 h 128446"/>
-                <a:gd name="connsiteX1" fmla="*/ 128284 w 128470"/>
-                <a:gd name="connsiteY1" fmla="*/ 24963 h 128446"/>
-                <a:gd name="connsiteX2" fmla="*/ 121175 w 128470"/>
-                <a:gd name="connsiteY2" fmla="*/ 128419 h 128446"/>
-                <a:gd name="connsiteX3" fmla="*/ -186 w 128470"/>
-                <a:gd name="connsiteY3" fmla="*/ 78149 h 128446"/>
-              </a:gdLst>
-              <a:ahLst/>
-              <a:cxnLst>
-                <a:cxn ang="0">
-                  <a:pos x="connsiteX0" y="connsiteY0"/>
-                </a:cxn>
-                <a:cxn ang="0">
-                  <a:pos x="connsiteX1" y="connsiteY1"/>
-                </a:cxn>
-                <a:cxn ang="0">
-                  <a:pos x="connsiteX2" y="connsiteY2"/>
-                </a:cxn>
-                <a:cxn ang="0">
-                  <a:pos x="connsiteX3" y="connsiteY3"/>
-                </a:cxn>
-              </a:cxnLst>
-              <a:rect l="l" t="t" r="r" b="b"/>
-              <a:pathLst>
-                <a:path w="128470" h="128446">
-                  <a:moveTo>
-                    <a:pt x="67941" y="-27"/>
-                  </a:moveTo>
-                  <a:lnTo>
-                    <a:pt x="128284" y="24963"/>
-                  </a:lnTo>
-                  <a:lnTo>
-                    <a:pt x="121175" y="128419"/>
-                  </a:lnTo>
-                  <a:lnTo>
-                    <a:pt x="-186" y="78149"/>
-                  </a:lnTo>
-                  <a:close/>
-                </a:path>
-              </a:pathLst>
-            </a:custGeom>
-            <a:solidFill>
-              <a:srgbClr val="727272"/>
-            </a:solidFill>
-            <a:ln w="8032" cap="flat">
-              <a:noFill/>
-              <a:prstDash val="solid"/>
-              <a:miter/>
-            </a:ln>
-          </p:spPr>
-          <p:txBody>
-            <a:bodyPr rtlCol="0" anchor="ctr"/>
-            <a:lstStyle/>
-            <a:p>
-              <a:endParaRPr lang="en-US">
-                <a:latin typeface="Gill Sans MT" panose="020B0502020104020203" pitchFamily="34" charset="77"/>
-              </a:endParaRPr>
-            </a:p>
-          </p:txBody>
-        </p:sp>
-        <p:sp>
-          <p:nvSpPr>
-            <p:cNvPr id="480" name="Freeform: Shape 479">
-              <a:extLst>
-                <a:ext uri="{FF2B5EF4-FFF2-40B4-BE49-F238E27FC236}">
-                  <a16:creationId xmlns:a16="http://schemas.microsoft.com/office/drawing/2014/main" id="{D753CC81-753B-3028-3C0A-F204E70D8448}"/>
-                </a:ext>
-              </a:extLst>
-            </p:cNvPr>
-            <p:cNvSpPr/>
-            <p:nvPr/>
-          </p:nvSpPr>
-          <p:spPr>
-            <a:xfrm>
-              <a:off x="7480510" y="3470803"/>
-              <a:ext cx="128470" cy="128446"/>
-            </a:xfrm>
-            <a:custGeom>
-              <a:avLst/>
-              <a:gdLst>
-                <a:gd name="connsiteX0" fmla="*/ 128284 w 128470"/>
-                <a:gd name="connsiteY0" fmla="*/ 103421 h 128446"/>
-                <a:gd name="connsiteX1" fmla="*/ 67941 w 128470"/>
-                <a:gd name="connsiteY1" fmla="*/ 128419 h 128446"/>
-                <a:gd name="connsiteX2" fmla="*/ -186 w 128470"/>
-                <a:gd name="connsiteY2" fmla="*/ 50243 h 128446"/>
-                <a:gd name="connsiteX3" fmla="*/ 121175 w 128470"/>
-                <a:gd name="connsiteY3" fmla="*/ -27 h 128446"/>
-              </a:gdLst>
-              <a:ahLst/>
-              <a:cxnLst>
-                <a:cxn ang="0">
-                  <a:pos x="connsiteX0" y="connsiteY0"/>
-                </a:cxn>
-                <a:cxn ang="0">
-                  <a:pos x="connsiteX1" y="connsiteY1"/>
-                </a:cxn>
-                <a:cxn ang="0">
-                  <a:pos x="connsiteX2" y="connsiteY2"/>
-                </a:cxn>
-                <a:cxn ang="0">
-                  <a:pos x="connsiteX3" y="connsiteY3"/>
-                </a:cxn>
-              </a:cxnLst>
-              <a:rect l="l" t="t" r="r" b="b"/>
-              <a:pathLst>
-                <a:path w="128470" h="128446">
-                  <a:moveTo>
-                    <a:pt x="128284" y="103421"/>
-                  </a:moveTo>
-                  <a:lnTo>
-                    <a:pt x="67941" y="128419"/>
-                  </a:lnTo>
-                  <a:lnTo>
-                    <a:pt x="-186" y="50243"/>
-                  </a:lnTo>
-                  <a:lnTo>
-                    <a:pt x="121175" y="-27"/>
-                  </a:lnTo>
-                  <a:close/>
-                </a:path>
-              </a:pathLst>
-            </a:custGeom>
-            <a:solidFill>
-              <a:srgbClr val="727272"/>
-            </a:solidFill>
-            <a:ln w="8032" cap="flat">
-              <a:noFill/>
-              <a:prstDash val="solid"/>
-              <a:miter/>
-            </a:ln>
-          </p:spPr>
-          <p:txBody>
-            <a:bodyPr rtlCol="0" anchor="ctr"/>
-            <a:lstStyle/>
-            <a:p>
-              <a:endParaRPr lang="en-US">
-                <a:latin typeface="Gill Sans MT" panose="020B0502020104020203" pitchFamily="34" charset="77"/>
-              </a:endParaRPr>
-            </a:p>
-          </p:txBody>
-        </p:sp>
-        <p:sp>
-          <p:nvSpPr>
-            <p:cNvPr id="481" name="Freeform: Shape 480">
-              <a:extLst>
-                <a:ext uri="{FF2B5EF4-FFF2-40B4-BE49-F238E27FC236}">
-                  <a16:creationId xmlns:a16="http://schemas.microsoft.com/office/drawing/2014/main" id="{AAE69042-2767-8EE8-4A09-95AC92356CA5}"/>
-                </a:ext>
-              </a:extLst>
-            </p:cNvPr>
-            <p:cNvSpPr/>
-            <p:nvPr/>
-          </p:nvSpPr>
-          <p:spPr>
-            <a:xfrm>
-              <a:off x="7304324" y="3470803"/>
-              <a:ext cx="128462" cy="128446"/>
-            </a:xfrm>
-            <a:custGeom>
-              <a:avLst/>
-              <a:gdLst>
-                <a:gd name="connsiteX0" fmla="*/ 60150 w 128462"/>
-                <a:gd name="connsiteY0" fmla="*/ 128419 h 128446"/>
-                <a:gd name="connsiteX1" fmla="*/ -186 w 128462"/>
-                <a:gd name="connsiteY1" fmla="*/ 103421 h 128446"/>
-                <a:gd name="connsiteX2" fmla="*/ 6915 w 128462"/>
-                <a:gd name="connsiteY2" fmla="*/ -27 h 128446"/>
-                <a:gd name="connsiteX3" fmla="*/ 128276 w 128462"/>
-                <a:gd name="connsiteY3" fmla="*/ 50243 h 128446"/>
-              </a:gdLst>
-              <a:ahLst/>
-              <a:cxnLst>
-                <a:cxn ang="0">
-                  <a:pos x="connsiteX0" y="connsiteY0"/>
-                </a:cxn>
-                <a:cxn ang="0">
-                  <a:pos x="connsiteX1" y="connsiteY1"/>
-                </a:cxn>
-                <a:cxn ang="0">
-                  <a:pos x="connsiteX2" y="connsiteY2"/>
-                </a:cxn>
-                <a:cxn ang="0">
-                  <a:pos x="connsiteX3" y="connsiteY3"/>
-                </a:cxn>
-              </a:cxnLst>
-              <a:rect l="l" t="t" r="r" b="b"/>
-              <a:pathLst>
-                <a:path w="128462" h="128446">
-                  <a:moveTo>
-                    <a:pt x="60150" y="128419"/>
-                  </a:moveTo>
-                  <a:lnTo>
-                    <a:pt x="-186" y="103421"/>
-                  </a:lnTo>
-                  <a:lnTo>
-                    <a:pt x="6915" y="-27"/>
-                  </a:lnTo>
-                  <a:lnTo>
-                    <a:pt x="128276" y="50243"/>
-                  </a:lnTo>
-                  <a:close/>
-                </a:path>
-              </a:pathLst>
-            </a:custGeom>
-            <a:solidFill>
-              <a:srgbClr val="727272"/>
-            </a:solidFill>
-            <a:ln w="8032" cap="flat">
-              <a:noFill/>
-              <a:prstDash val="solid"/>
-              <a:miter/>
-            </a:ln>
-          </p:spPr>
-          <p:txBody>
-            <a:bodyPr rtlCol="0" anchor="ctr"/>
-            <a:lstStyle/>
-            <a:p>
-              <a:endParaRPr lang="en-US">
-                <a:latin typeface="Gill Sans MT" panose="020B0502020104020203" pitchFamily="34" charset="77"/>
-              </a:endParaRPr>
-            </a:p>
-          </p:txBody>
-        </p:sp>
-        <p:sp>
-          <p:nvSpPr>
-            <p:cNvPr id="482" name="Freeform: Shape 481">
-              <a:extLst>
-                <a:ext uri="{FF2B5EF4-FFF2-40B4-BE49-F238E27FC236}">
-                  <a16:creationId xmlns:a16="http://schemas.microsoft.com/office/drawing/2014/main" id="{753E8B45-D0F7-5C04-E226-7C9A88E66D77}"/>
-                </a:ext>
-              </a:extLst>
-            </p:cNvPr>
-            <p:cNvSpPr/>
-            <p:nvPr/>
-          </p:nvSpPr>
-          <p:spPr>
-            <a:xfrm>
-              <a:off x="7631006" y="3142482"/>
-              <a:ext cx="128446" cy="128462"/>
-            </a:xfrm>
-            <a:custGeom>
-              <a:avLst/>
-              <a:gdLst>
-                <a:gd name="connsiteX0" fmla="*/ 103262 w 128446"/>
-                <a:gd name="connsiteY0" fmla="*/ -27 h 128462"/>
-                <a:gd name="connsiteX1" fmla="*/ 128260 w 128446"/>
-                <a:gd name="connsiteY1" fmla="*/ 60308 h 128462"/>
-                <a:gd name="connsiteX2" fmla="*/ 50084 w 128446"/>
-                <a:gd name="connsiteY2" fmla="*/ 128435 h 128462"/>
-                <a:gd name="connsiteX3" fmla="*/ -186 w 128446"/>
-                <a:gd name="connsiteY3" fmla="*/ 7074 h 128462"/>
-              </a:gdLst>
-              <a:ahLst/>
-              <a:cxnLst>
-                <a:cxn ang="0">
-                  <a:pos x="connsiteX0" y="connsiteY0"/>
-                </a:cxn>
-                <a:cxn ang="0">
-                  <a:pos x="connsiteX1" y="connsiteY1"/>
-                </a:cxn>
-                <a:cxn ang="0">
-                  <a:pos x="connsiteX2" y="connsiteY2"/>
-                </a:cxn>
-                <a:cxn ang="0">
-                  <a:pos x="connsiteX3" y="connsiteY3"/>
-                </a:cxn>
-              </a:cxnLst>
-              <a:rect l="l" t="t" r="r" b="b"/>
-              <a:pathLst>
-                <a:path w="128446" h="128462">
-                  <a:moveTo>
-                    <a:pt x="103262" y="-27"/>
-                  </a:moveTo>
-                  <a:lnTo>
-                    <a:pt x="128260" y="60308"/>
-                  </a:lnTo>
-                  <a:lnTo>
-                    <a:pt x="50084" y="128435"/>
-                  </a:lnTo>
-                  <a:lnTo>
-                    <a:pt x="-186" y="7074"/>
-                  </a:lnTo>
-                  <a:close/>
-                </a:path>
-              </a:pathLst>
-            </a:custGeom>
-            <a:solidFill>
-              <a:srgbClr val="727272"/>
-            </a:solidFill>
-            <a:ln w="8032" cap="flat">
-              <a:noFill/>
-              <a:prstDash val="solid"/>
-              <a:miter/>
-            </a:ln>
-          </p:spPr>
-          <p:txBody>
-            <a:bodyPr rtlCol="0" anchor="ctr"/>
-            <a:lstStyle/>
-            <a:p>
-              <a:endParaRPr lang="en-US">
-                <a:latin typeface="Gill Sans MT" panose="020B0502020104020203" pitchFamily="34" charset="77"/>
-              </a:endParaRPr>
-            </a:p>
-          </p:txBody>
-        </p:sp>
-        <p:sp>
-          <p:nvSpPr>
-            <p:cNvPr id="483" name="Freeform: Shape 482">
-              <a:extLst>
-                <a:ext uri="{FF2B5EF4-FFF2-40B4-BE49-F238E27FC236}">
-                  <a16:creationId xmlns:a16="http://schemas.microsoft.com/office/drawing/2014/main" id="{1A204DB2-F1B8-B8B9-C2FE-9A806C286BAD}"/>
-                </a:ext>
-              </a:extLst>
-            </p:cNvPr>
-            <p:cNvSpPr/>
-            <p:nvPr/>
-          </p:nvSpPr>
-          <p:spPr>
-            <a:xfrm>
-              <a:off x="7631006" y="3315993"/>
-              <a:ext cx="128446" cy="128462"/>
-            </a:xfrm>
-            <a:custGeom>
-              <a:avLst/>
-              <a:gdLst>
-                <a:gd name="connsiteX0" fmla="*/ 128260 w 128446"/>
-                <a:gd name="connsiteY0" fmla="*/ 68100 h 128462"/>
-                <a:gd name="connsiteX1" fmla="*/ 103262 w 128446"/>
-                <a:gd name="connsiteY1" fmla="*/ 128435 h 128462"/>
-                <a:gd name="connsiteX2" fmla="*/ -186 w 128446"/>
-                <a:gd name="connsiteY2" fmla="*/ 121334 h 128462"/>
-                <a:gd name="connsiteX3" fmla="*/ 50084 w 128446"/>
-                <a:gd name="connsiteY3" fmla="*/ -27 h 128462"/>
-              </a:gdLst>
-              <a:ahLst/>
-              <a:cxnLst>
-                <a:cxn ang="0">
-                  <a:pos x="connsiteX0" y="connsiteY0"/>
-                </a:cxn>
-                <a:cxn ang="0">
-                  <a:pos x="connsiteX1" y="connsiteY1"/>
-                </a:cxn>
-                <a:cxn ang="0">
-                  <a:pos x="connsiteX2" y="connsiteY2"/>
-                </a:cxn>
-                <a:cxn ang="0">
-                  <a:pos x="connsiteX3" y="connsiteY3"/>
-                </a:cxn>
-              </a:cxnLst>
-              <a:rect l="l" t="t" r="r" b="b"/>
-              <a:pathLst>
-                <a:path w="128446" h="128462">
-                  <a:moveTo>
-                    <a:pt x="128260" y="68100"/>
-                  </a:moveTo>
-                  <a:lnTo>
-                    <a:pt x="103262" y="128435"/>
-                  </a:lnTo>
-                  <a:lnTo>
-                    <a:pt x="-186" y="121334"/>
-                  </a:lnTo>
-                  <a:lnTo>
-                    <a:pt x="50084" y="-27"/>
-                  </a:lnTo>
-                  <a:close/>
-                </a:path>
-              </a:pathLst>
-            </a:custGeom>
-            <a:solidFill>
-              <a:srgbClr val="727272"/>
-            </a:solidFill>
-            <a:ln w="8032" cap="flat">
-              <a:noFill/>
-              <a:prstDash val="solid"/>
-              <a:miter/>
-            </a:ln>
-          </p:spPr>
-          <p:txBody>
-            <a:bodyPr rtlCol="0" anchor="ctr"/>
-            <a:lstStyle/>
-            <a:p>
-              <a:endParaRPr lang="en-US">
-                <a:latin typeface="Gill Sans MT" panose="020B0502020104020203" pitchFamily="34" charset="77"/>
-              </a:endParaRPr>
-            </a:p>
-          </p:txBody>
-        </p:sp>
-        <p:sp>
-          <p:nvSpPr>
-            <p:cNvPr id="484" name="Freeform: Shape 483">
-              <a:extLst>
-                <a:ext uri="{FF2B5EF4-FFF2-40B4-BE49-F238E27FC236}">
-                  <a16:creationId xmlns:a16="http://schemas.microsoft.com/office/drawing/2014/main" id="{27C42044-F604-701F-E0EA-BE6FBA5B5F86}"/>
-                </a:ext>
-              </a:extLst>
-            </p:cNvPr>
-            <p:cNvSpPr/>
-            <p:nvPr/>
-          </p:nvSpPr>
-          <p:spPr>
-            <a:xfrm>
-              <a:off x="7150912" y="3315993"/>
-              <a:ext cx="128437" cy="128462"/>
-            </a:xfrm>
-            <a:custGeom>
-              <a:avLst/>
-              <a:gdLst>
-                <a:gd name="connsiteX0" fmla="*/ 24804 w 128437"/>
-                <a:gd name="connsiteY0" fmla="*/ 128435 h 128462"/>
-                <a:gd name="connsiteX1" fmla="*/ -186 w 128437"/>
-                <a:gd name="connsiteY1" fmla="*/ 68100 h 128462"/>
-                <a:gd name="connsiteX2" fmla="*/ 77982 w 128437"/>
-                <a:gd name="connsiteY2" fmla="*/ -27 h 128462"/>
-                <a:gd name="connsiteX3" fmla="*/ 128252 w 128437"/>
-                <a:gd name="connsiteY3" fmla="*/ 121334 h 128462"/>
-              </a:gdLst>
-              <a:ahLst/>
-              <a:cxnLst>
-                <a:cxn ang="0">
-                  <a:pos x="connsiteX0" y="connsiteY0"/>
-                </a:cxn>
-                <a:cxn ang="0">
-                  <a:pos x="connsiteX1" y="connsiteY1"/>
-                </a:cxn>
-                <a:cxn ang="0">
-                  <a:pos x="connsiteX2" y="connsiteY2"/>
-                </a:cxn>
-                <a:cxn ang="0">
-                  <a:pos x="connsiteX3" y="connsiteY3"/>
-                </a:cxn>
-              </a:cxnLst>
-              <a:rect l="l" t="t" r="r" b="b"/>
-              <a:pathLst>
-                <a:path w="128437" h="128462">
-                  <a:moveTo>
-                    <a:pt x="24804" y="128435"/>
-                  </a:moveTo>
-                  <a:lnTo>
-                    <a:pt x="-186" y="68100"/>
-                  </a:lnTo>
-                  <a:lnTo>
-                    <a:pt x="77982" y="-27"/>
-                  </a:lnTo>
-                  <a:lnTo>
-                    <a:pt x="128252" y="121334"/>
-                  </a:lnTo>
-                  <a:close/>
-                </a:path>
-              </a:pathLst>
-            </a:custGeom>
-            <a:solidFill>
-              <a:srgbClr val="727272"/>
-            </a:solidFill>
-            <a:ln w="8032" cap="flat">
-              <a:noFill/>
-              <a:prstDash val="solid"/>
-              <a:miter/>
-            </a:ln>
-          </p:spPr>
-          <p:txBody>
-            <a:bodyPr rtlCol="0" anchor="ctr"/>
-            <a:lstStyle/>
-            <a:p>
-              <a:endParaRPr lang="en-US">
-                <a:latin typeface="Gill Sans MT" panose="020B0502020104020203" pitchFamily="34" charset="77"/>
-              </a:endParaRPr>
-            </a:p>
-          </p:txBody>
-        </p:sp>
-        <p:sp>
-          <p:nvSpPr>
-            <p:cNvPr id="485" name="Freeform: Shape 484">
-              <a:extLst>
-                <a:ext uri="{FF2B5EF4-FFF2-40B4-BE49-F238E27FC236}">
-                  <a16:creationId xmlns:a16="http://schemas.microsoft.com/office/drawing/2014/main" id="{97F8EBAA-C4BC-C088-2C41-5C0E43DB986D}"/>
-                </a:ext>
-              </a:extLst>
-            </p:cNvPr>
-            <p:cNvSpPr/>
-            <p:nvPr/>
-          </p:nvSpPr>
-          <p:spPr>
-            <a:xfrm>
-              <a:off x="7150912" y="3142482"/>
-              <a:ext cx="128437" cy="128462"/>
-            </a:xfrm>
-            <a:custGeom>
-              <a:avLst/>
-              <a:gdLst>
-                <a:gd name="connsiteX0" fmla="*/ -186 w 128437"/>
-                <a:gd name="connsiteY0" fmla="*/ 60308 h 128462"/>
-                <a:gd name="connsiteX1" fmla="*/ 24804 w 128437"/>
-                <a:gd name="connsiteY1" fmla="*/ -27 h 128462"/>
-                <a:gd name="connsiteX2" fmla="*/ 128252 w 128437"/>
-                <a:gd name="connsiteY2" fmla="*/ 7074 h 128462"/>
-                <a:gd name="connsiteX3" fmla="*/ 77982 w 128437"/>
-                <a:gd name="connsiteY3" fmla="*/ 128435 h 128462"/>
-              </a:gdLst>
-              <a:ahLst/>
-              <a:cxnLst>
-                <a:cxn ang="0">
-                  <a:pos x="connsiteX0" y="connsiteY0"/>
-                </a:cxn>
-                <a:cxn ang="0">
-                  <a:pos x="connsiteX1" y="connsiteY1"/>
-                </a:cxn>
-                <a:cxn ang="0">
-                  <a:pos x="connsiteX2" y="connsiteY2"/>
-                </a:cxn>
-                <a:cxn ang="0">
-                  <a:pos x="connsiteX3" y="connsiteY3"/>
-                </a:cxn>
-              </a:cxnLst>
-              <a:rect l="l" t="t" r="r" b="b"/>
-              <a:pathLst>
-                <a:path w="128437" h="128462">
-                  <a:moveTo>
-                    <a:pt x="-186" y="60308"/>
-                  </a:moveTo>
-                  <a:lnTo>
-                    <a:pt x="24804" y="-27"/>
-                  </a:lnTo>
-                  <a:lnTo>
-                    <a:pt x="128252" y="7074"/>
-                  </a:lnTo>
-                  <a:lnTo>
-                    <a:pt x="77982" y="128435"/>
-                  </a:lnTo>
-                  <a:close/>
-                </a:path>
-              </a:pathLst>
-            </a:custGeom>
-            <a:solidFill>
-              <a:srgbClr val="727272"/>
-            </a:solidFill>
-            <a:ln w="8032" cap="flat">
-              <a:noFill/>
-              <a:prstDash val="solid"/>
-              <a:miter/>
-            </a:ln>
-          </p:spPr>
-          <p:txBody>
-            <a:bodyPr rtlCol="0" anchor="ctr"/>
-            <a:lstStyle/>
-            <a:p>
-              <a:endParaRPr lang="en-US">
-                <a:latin typeface="Gill Sans MT" panose="020B0502020104020203" pitchFamily="34" charset="77"/>
-              </a:endParaRPr>
-            </a:p>
-          </p:txBody>
-        </p:sp>
-        <p:sp>
-          <p:nvSpPr>
-            <p:cNvPr id="475" name="Freeform: Shape 474">
-              <a:extLst>
-                <a:ext uri="{FF2B5EF4-FFF2-40B4-BE49-F238E27FC236}">
-                  <a16:creationId xmlns:a16="http://schemas.microsoft.com/office/drawing/2014/main" id="{02E7673B-854C-0B39-E45B-50DF727753D1}"/>
-                </a:ext>
-              </a:extLst>
-            </p:cNvPr>
-            <p:cNvSpPr/>
-            <p:nvPr/>
-          </p:nvSpPr>
-          <p:spPr>
-            <a:xfrm>
-              <a:off x="7095019" y="2931506"/>
-              <a:ext cx="720584" cy="720584"/>
-            </a:xfrm>
-            <a:custGeom>
-              <a:avLst/>
-              <a:gdLst>
-                <a:gd name="connsiteX0" fmla="*/ -186 w 720584"/>
-                <a:gd name="connsiteY0" fmla="*/ -27 h 720584"/>
-                <a:gd name="connsiteX1" fmla="*/ 720398 w 720584"/>
-                <a:gd name="connsiteY1" fmla="*/ -27 h 720584"/>
-                <a:gd name="connsiteX2" fmla="*/ 720398 w 720584"/>
-                <a:gd name="connsiteY2" fmla="*/ 720557 h 720584"/>
-                <a:gd name="connsiteX3" fmla="*/ -186 w 720584"/>
-                <a:gd name="connsiteY3" fmla="*/ 720557 h 720584"/>
-              </a:gdLst>
-              <a:ahLst/>
-              <a:cxnLst>
-                <a:cxn ang="0">
-                  <a:pos x="connsiteX0" y="connsiteY0"/>
-                </a:cxn>
-                <a:cxn ang="0">
-                  <a:pos x="connsiteX1" y="connsiteY1"/>
-                </a:cxn>
-                <a:cxn ang="0">
-                  <a:pos x="connsiteX2" y="connsiteY2"/>
-                </a:cxn>
-                <a:cxn ang="0">
-                  <a:pos x="connsiteX3" y="connsiteY3"/>
-                </a:cxn>
-              </a:cxnLst>
-              <a:rect l="l" t="t" r="r" b="b"/>
-              <a:pathLst>
-                <a:path w="720584" h="720584">
-                  <a:moveTo>
-                    <a:pt x="-186" y="-27"/>
-                  </a:moveTo>
-                  <a:lnTo>
-                    <a:pt x="720398" y="-27"/>
-                  </a:lnTo>
-                  <a:lnTo>
-                    <a:pt x="720398" y="720557"/>
-                  </a:lnTo>
-                  <a:lnTo>
-                    <a:pt x="-186" y="720557"/>
-                  </a:lnTo>
-                  <a:close/>
-                </a:path>
-              </a:pathLst>
-            </a:custGeom>
-            <a:solidFill>
-              <a:srgbClr val="FFFFFF"/>
-            </a:solidFill>
-            <a:ln w="66637" cap="rnd">
-              <a:solidFill>
-                <a:srgbClr val="727272"/>
-              </a:solidFill>
-              <a:prstDash val="solid"/>
-              <a:miter/>
-            </a:ln>
-          </p:spPr>
-          <p:txBody>
-            <a:bodyPr rtlCol="0" anchor="ctr"/>
-            <a:lstStyle/>
-            <a:p>
-              <a:endParaRPr lang="en-US">
-                <a:latin typeface="Gill Sans MT" panose="020B0502020104020203" pitchFamily="34" charset="77"/>
-              </a:endParaRPr>
-            </a:p>
-          </p:txBody>
-        </p:sp>
-      </p:grpSp>
-      <p:grpSp>
-        <p:nvGrpSpPr>
           <p:cNvPr id="448" name="Graphic 4">
             <a:extLst>
               <a:ext uri="{FF2B5EF4-FFF2-40B4-BE49-F238E27FC236}">
@@ -22194,6 +21236,963 @@
           </p:txBody>
         </p:sp>
       </p:grpSp>
+      <p:grpSp>
+        <p:nvGrpSpPr>
+          <p:cNvPr id="5" name="Graphic 4">
+            <a:extLst>
+              <a:ext uri="{FF2B5EF4-FFF2-40B4-BE49-F238E27FC236}">
+                <a16:creationId xmlns:a16="http://schemas.microsoft.com/office/drawing/2014/main" id="{A1797310-7695-B1E8-F6B9-609055A44D2D}"/>
+              </a:ext>
+            </a:extLst>
+          </p:cNvPr>
+          <p:cNvGrpSpPr/>
+          <p:nvPr/>
+        </p:nvGrpSpPr>
+        <p:grpSpPr>
+          <a:xfrm>
+            <a:off x="6555834" y="1921519"/>
+            <a:ext cx="437299" cy="428715"/>
+            <a:chOff x="6813867" y="1750668"/>
+            <a:chExt cx="720584" cy="720584"/>
+          </a:xfrm>
+        </p:grpSpPr>
+        <p:sp>
+          <p:nvSpPr>
+            <p:cNvPr id="6" name="Freeform: Shape 463">
+              <a:extLst>
+                <a:ext uri="{FF2B5EF4-FFF2-40B4-BE49-F238E27FC236}">
+                  <a16:creationId xmlns:a16="http://schemas.microsoft.com/office/drawing/2014/main" id="{BCA0BEDD-C2D0-72A0-1556-CE40A9DB4332}"/>
+                </a:ext>
+              </a:extLst>
+            </p:cNvPr>
+            <p:cNvSpPr/>
+            <p:nvPr/>
+          </p:nvSpPr>
+          <p:spPr>
+            <a:xfrm>
+              <a:off x="6813867" y="1750668"/>
+              <a:ext cx="720584" cy="720584"/>
+            </a:xfrm>
+            <a:custGeom>
+              <a:avLst/>
+              <a:gdLst>
+                <a:gd name="connsiteX0" fmla="*/ -186 w 720584"/>
+                <a:gd name="connsiteY0" fmla="*/ -27 h 720584"/>
+                <a:gd name="connsiteX1" fmla="*/ 720398 w 720584"/>
+                <a:gd name="connsiteY1" fmla="*/ -27 h 720584"/>
+                <a:gd name="connsiteX2" fmla="*/ 720398 w 720584"/>
+                <a:gd name="connsiteY2" fmla="*/ 720557 h 720584"/>
+                <a:gd name="connsiteX3" fmla="*/ -186 w 720584"/>
+                <a:gd name="connsiteY3" fmla="*/ 720557 h 720584"/>
+              </a:gdLst>
+              <a:ahLst/>
+              <a:cxnLst>
+                <a:cxn ang="0">
+                  <a:pos x="connsiteX0" y="connsiteY0"/>
+                </a:cxn>
+                <a:cxn ang="0">
+                  <a:pos x="connsiteX1" y="connsiteY1"/>
+                </a:cxn>
+                <a:cxn ang="0">
+                  <a:pos x="connsiteX2" y="connsiteY2"/>
+                </a:cxn>
+                <a:cxn ang="0">
+                  <a:pos x="connsiteX3" y="connsiteY3"/>
+                </a:cxn>
+              </a:cxnLst>
+              <a:rect l="l" t="t" r="r" b="b"/>
+              <a:pathLst>
+                <a:path w="720584" h="720584">
+                  <a:moveTo>
+                    <a:pt x="-186" y="-27"/>
+                  </a:moveTo>
+                  <a:lnTo>
+                    <a:pt x="720398" y="-27"/>
+                  </a:lnTo>
+                  <a:lnTo>
+                    <a:pt x="720398" y="720557"/>
+                  </a:lnTo>
+                  <a:lnTo>
+                    <a:pt x="-186" y="720557"/>
+                  </a:lnTo>
+                  <a:close/>
+                </a:path>
+              </a:pathLst>
+            </a:custGeom>
+            <a:solidFill>
+              <a:srgbClr val="FFFFFF"/>
+            </a:solidFill>
+            <a:ln w="66637" cap="rnd">
+              <a:solidFill>
+                <a:srgbClr val="727272"/>
+              </a:solidFill>
+              <a:prstDash val="solid"/>
+              <a:miter/>
+            </a:ln>
+          </p:spPr>
+          <p:txBody>
+            <a:bodyPr rtlCol="0" anchor="ctr"/>
+            <a:lstStyle/>
+            <a:p>
+              <a:endParaRPr lang="en-US">
+                <a:latin typeface="Gill Sans MT" panose="020B0502020104020203" pitchFamily="34" charset="77"/>
+              </a:endParaRPr>
+            </a:p>
+          </p:txBody>
+        </p:sp>
+        <p:sp>
+          <p:nvSpPr>
+            <p:cNvPr id="7" name="Freeform: Shape 464">
+              <a:extLst>
+                <a:ext uri="{FF2B5EF4-FFF2-40B4-BE49-F238E27FC236}">
+                  <a16:creationId xmlns:a16="http://schemas.microsoft.com/office/drawing/2014/main" id="{B67BFCEE-B42C-2F58-9FED-0310F258A9F8}"/>
+                </a:ext>
+              </a:extLst>
+            </p:cNvPr>
+            <p:cNvSpPr/>
+            <p:nvPr/>
+          </p:nvSpPr>
+          <p:spPr>
+            <a:xfrm>
+              <a:off x="6975625" y="1912427"/>
+              <a:ext cx="397067" cy="397066"/>
+            </a:xfrm>
+            <a:custGeom>
+              <a:avLst/>
+              <a:gdLst>
+                <a:gd name="connsiteX0" fmla="*/ 396881 w 397067"/>
+                <a:gd name="connsiteY0" fmla="*/ 198506 h 397066"/>
+                <a:gd name="connsiteX1" fmla="*/ 198348 w 397067"/>
+                <a:gd name="connsiteY1" fmla="*/ 397040 h 397066"/>
+                <a:gd name="connsiteX2" fmla="*/ -186 w 397067"/>
+                <a:gd name="connsiteY2" fmla="*/ 198506 h 397066"/>
+                <a:gd name="connsiteX3" fmla="*/ 198348 w 397067"/>
+                <a:gd name="connsiteY3" fmla="*/ -27 h 397066"/>
+                <a:gd name="connsiteX4" fmla="*/ 396881 w 397067"/>
+                <a:gd name="connsiteY4" fmla="*/ 198506 h 397066"/>
+              </a:gdLst>
+              <a:ahLst/>
+              <a:cxnLst>
+                <a:cxn ang="0">
+                  <a:pos x="connsiteX0" y="connsiteY0"/>
+                </a:cxn>
+                <a:cxn ang="0">
+                  <a:pos x="connsiteX1" y="connsiteY1"/>
+                </a:cxn>
+                <a:cxn ang="0">
+                  <a:pos x="connsiteX2" y="connsiteY2"/>
+                </a:cxn>
+                <a:cxn ang="0">
+                  <a:pos x="connsiteX3" y="connsiteY3"/>
+                </a:cxn>
+                <a:cxn ang="0">
+                  <a:pos x="connsiteX4" y="connsiteY4"/>
+                </a:cxn>
+              </a:cxnLst>
+              <a:rect l="l" t="t" r="r" b="b"/>
+              <a:pathLst>
+                <a:path w="397067" h="397066">
+                  <a:moveTo>
+                    <a:pt x="396881" y="198506"/>
+                  </a:moveTo>
+                  <a:cubicBezTo>
+                    <a:pt x="396881" y="308155"/>
+                    <a:pt x="307997" y="397040"/>
+                    <a:pt x="198348" y="397040"/>
+                  </a:cubicBezTo>
+                  <a:cubicBezTo>
+                    <a:pt x="88698" y="397040"/>
+                    <a:pt x="-186" y="308155"/>
+                    <a:pt x="-186" y="198506"/>
+                  </a:cubicBezTo>
+                  <a:cubicBezTo>
+                    <a:pt x="-186" y="88857"/>
+                    <a:pt x="88698" y="-27"/>
+                    <a:pt x="198348" y="-27"/>
+                  </a:cubicBezTo>
+                  <a:cubicBezTo>
+                    <a:pt x="307997" y="-27"/>
+                    <a:pt x="396881" y="88857"/>
+                    <a:pt x="396881" y="198506"/>
+                  </a:cubicBezTo>
+                  <a:close/>
+                </a:path>
+              </a:pathLst>
+            </a:custGeom>
+            <a:noFill/>
+            <a:ln w="69046" cap="rnd">
+              <a:solidFill>
+                <a:srgbClr val="727272"/>
+              </a:solidFill>
+              <a:prstDash val="solid"/>
+              <a:miter/>
+            </a:ln>
+          </p:spPr>
+          <p:txBody>
+            <a:bodyPr rtlCol="0" anchor="ctr"/>
+            <a:lstStyle/>
+            <a:p>
+              <a:endParaRPr lang="en-US">
+                <a:latin typeface="Gill Sans MT" panose="020B0502020104020203" pitchFamily="34" charset="77"/>
+              </a:endParaRPr>
+            </a:p>
+          </p:txBody>
+        </p:sp>
+        <p:sp>
+          <p:nvSpPr>
+            <p:cNvPr id="8" name="Freeform: Shape 465">
+              <a:extLst>
+                <a:ext uri="{FF2B5EF4-FFF2-40B4-BE49-F238E27FC236}">
+                  <a16:creationId xmlns:a16="http://schemas.microsoft.com/office/drawing/2014/main" id="{67F30C86-1386-4F5A-121A-45DBEFD30C53}"/>
+                </a:ext>
+              </a:extLst>
+            </p:cNvPr>
+            <p:cNvSpPr/>
+            <p:nvPr/>
+          </p:nvSpPr>
+          <p:spPr>
+            <a:xfrm>
+              <a:off x="7087403" y="2025876"/>
+              <a:ext cx="173510" cy="173510"/>
+            </a:xfrm>
+            <a:custGeom>
+              <a:avLst/>
+              <a:gdLst>
+                <a:gd name="connsiteX0" fmla="*/ 173325 w 173510"/>
+                <a:gd name="connsiteY0" fmla="*/ 86728 h 173510"/>
+                <a:gd name="connsiteX1" fmla="*/ 86569 w 173510"/>
+                <a:gd name="connsiteY1" fmla="*/ 173484 h 173510"/>
+                <a:gd name="connsiteX2" fmla="*/ -186 w 173510"/>
+                <a:gd name="connsiteY2" fmla="*/ 86728 h 173510"/>
+                <a:gd name="connsiteX3" fmla="*/ 86569 w 173510"/>
+                <a:gd name="connsiteY3" fmla="*/ -27 h 173510"/>
+                <a:gd name="connsiteX4" fmla="*/ 173325 w 173510"/>
+                <a:gd name="connsiteY4" fmla="*/ 86728 h 173510"/>
+              </a:gdLst>
+              <a:ahLst/>
+              <a:cxnLst>
+                <a:cxn ang="0">
+                  <a:pos x="connsiteX0" y="connsiteY0"/>
+                </a:cxn>
+                <a:cxn ang="0">
+                  <a:pos x="connsiteX1" y="connsiteY1"/>
+                </a:cxn>
+                <a:cxn ang="0">
+                  <a:pos x="connsiteX2" y="connsiteY2"/>
+                </a:cxn>
+                <a:cxn ang="0">
+                  <a:pos x="connsiteX3" y="connsiteY3"/>
+                </a:cxn>
+                <a:cxn ang="0">
+                  <a:pos x="connsiteX4" y="connsiteY4"/>
+                </a:cxn>
+              </a:cxnLst>
+              <a:rect l="l" t="t" r="r" b="b"/>
+              <a:pathLst>
+                <a:path w="173510" h="173510">
+                  <a:moveTo>
+                    <a:pt x="173325" y="86728"/>
+                  </a:moveTo>
+                  <a:cubicBezTo>
+                    <a:pt x="173325" y="134645"/>
+                    <a:pt x="134486" y="173484"/>
+                    <a:pt x="86569" y="173484"/>
+                  </a:cubicBezTo>
+                  <a:cubicBezTo>
+                    <a:pt x="38653" y="173484"/>
+                    <a:pt x="-186" y="134645"/>
+                    <a:pt x="-186" y="86728"/>
+                  </a:cubicBezTo>
+                  <a:cubicBezTo>
+                    <a:pt x="-186" y="38812"/>
+                    <a:pt x="38653" y="-27"/>
+                    <a:pt x="86569" y="-27"/>
+                  </a:cubicBezTo>
+                  <a:cubicBezTo>
+                    <a:pt x="134486" y="-27"/>
+                    <a:pt x="173325" y="38812"/>
+                    <a:pt x="173325" y="86728"/>
+                  </a:cubicBezTo>
+                  <a:close/>
+                </a:path>
+              </a:pathLst>
+            </a:custGeom>
+            <a:solidFill>
+              <a:srgbClr val="727272"/>
+            </a:solidFill>
+            <a:ln w="8032" cap="flat">
+              <a:noFill/>
+              <a:prstDash val="solid"/>
+              <a:miter/>
+            </a:ln>
+          </p:spPr>
+          <p:txBody>
+            <a:bodyPr rtlCol="0" anchor="ctr"/>
+            <a:lstStyle/>
+            <a:p>
+              <a:endParaRPr lang="en-US">
+                <a:latin typeface="Gill Sans MT" panose="020B0502020104020203" pitchFamily="34" charset="77"/>
+              </a:endParaRPr>
+            </a:p>
+          </p:txBody>
+        </p:sp>
+        <p:sp>
+          <p:nvSpPr>
+            <p:cNvPr id="9" name="Freeform: Shape 466">
+              <a:extLst>
+                <a:ext uri="{FF2B5EF4-FFF2-40B4-BE49-F238E27FC236}">
+                  <a16:creationId xmlns:a16="http://schemas.microsoft.com/office/drawing/2014/main" id="{206ABA5B-89FD-8222-8552-BD6AA084E831}"/>
+                </a:ext>
+              </a:extLst>
+            </p:cNvPr>
+            <p:cNvSpPr/>
+            <p:nvPr/>
+          </p:nvSpPr>
+          <p:spPr>
+            <a:xfrm>
+              <a:off x="7023172" y="1806850"/>
+              <a:ext cx="128462" cy="128446"/>
+            </a:xfrm>
+            <a:custGeom>
+              <a:avLst/>
+              <a:gdLst>
+                <a:gd name="connsiteX0" fmla="*/ -186 w 128462"/>
+                <a:gd name="connsiteY0" fmla="*/ 24963 h 128446"/>
+                <a:gd name="connsiteX1" fmla="*/ 60150 w 128462"/>
+                <a:gd name="connsiteY1" fmla="*/ -27 h 128446"/>
+                <a:gd name="connsiteX2" fmla="*/ 128276 w 128462"/>
+                <a:gd name="connsiteY2" fmla="*/ 78149 h 128446"/>
+                <a:gd name="connsiteX3" fmla="*/ 6915 w 128462"/>
+                <a:gd name="connsiteY3" fmla="*/ 128419 h 128446"/>
+              </a:gdLst>
+              <a:ahLst/>
+              <a:cxnLst>
+                <a:cxn ang="0">
+                  <a:pos x="connsiteX0" y="connsiteY0"/>
+                </a:cxn>
+                <a:cxn ang="0">
+                  <a:pos x="connsiteX1" y="connsiteY1"/>
+                </a:cxn>
+                <a:cxn ang="0">
+                  <a:pos x="connsiteX2" y="connsiteY2"/>
+                </a:cxn>
+                <a:cxn ang="0">
+                  <a:pos x="connsiteX3" y="connsiteY3"/>
+                </a:cxn>
+              </a:cxnLst>
+              <a:rect l="l" t="t" r="r" b="b"/>
+              <a:pathLst>
+                <a:path w="128462" h="128446">
+                  <a:moveTo>
+                    <a:pt x="-186" y="24963"/>
+                  </a:moveTo>
+                  <a:lnTo>
+                    <a:pt x="60150" y="-27"/>
+                  </a:lnTo>
+                  <a:lnTo>
+                    <a:pt x="128276" y="78149"/>
+                  </a:lnTo>
+                  <a:lnTo>
+                    <a:pt x="6915" y="128419"/>
+                  </a:lnTo>
+                  <a:close/>
+                </a:path>
+              </a:pathLst>
+            </a:custGeom>
+            <a:solidFill>
+              <a:srgbClr val="727272"/>
+            </a:solidFill>
+            <a:ln w="8032" cap="flat">
+              <a:noFill/>
+              <a:prstDash val="solid"/>
+              <a:miter/>
+            </a:ln>
+          </p:spPr>
+          <p:txBody>
+            <a:bodyPr rtlCol="0" anchor="ctr"/>
+            <a:lstStyle/>
+            <a:p>
+              <a:endParaRPr lang="en-US">
+                <a:latin typeface="Gill Sans MT" panose="020B0502020104020203" pitchFamily="34" charset="77"/>
+              </a:endParaRPr>
+            </a:p>
+          </p:txBody>
+        </p:sp>
+        <p:sp>
+          <p:nvSpPr>
+            <p:cNvPr id="10" name="Freeform: Shape 467">
+              <a:extLst>
+                <a:ext uri="{FF2B5EF4-FFF2-40B4-BE49-F238E27FC236}">
+                  <a16:creationId xmlns:a16="http://schemas.microsoft.com/office/drawing/2014/main" id="{808FB2BD-CD0E-FA24-7B3F-6A7FD2BBCA28}"/>
+                </a:ext>
+              </a:extLst>
+            </p:cNvPr>
+            <p:cNvSpPr/>
+            <p:nvPr/>
+          </p:nvSpPr>
+          <p:spPr>
+            <a:xfrm>
+              <a:off x="7199358" y="1806850"/>
+              <a:ext cx="128470" cy="128446"/>
+            </a:xfrm>
+            <a:custGeom>
+              <a:avLst/>
+              <a:gdLst>
+                <a:gd name="connsiteX0" fmla="*/ 67941 w 128470"/>
+                <a:gd name="connsiteY0" fmla="*/ -27 h 128446"/>
+                <a:gd name="connsiteX1" fmla="*/ 128284 w 128470"/>
+                <a:gd name="connsiteY1" fmla="*/ 24963 h 128446"/>
+                <a:gd name="connsiteX2" fmla="*/ 121175 w 128470"/>
+                <a:gd name="connsiteY2" fmla="*/ 128419 h 128446"/>
+                <a:gd name="connsiteX3" fmla="*/ -186 w 128470"/>
+                <a:gd name="connsiteY3" fmla="*/ 78149 h 128446"/>
+              </a:gdLst>
+              <a:ahLst/>
+              <a:cxnLst>
+                <a:cxn ang="0">
+                  <a:pos x="connsiteX0" y="connsiteY0"/>
+                </a:cxn>
+                <a:cxn ang="0">
+                  <a:pos x="connsiteX1" y="connsiteY1"/>
+                </a:cxn>
+                <a:cxn ang="0">
+                  <a:pos x="connsiteX2" y="connsiteY2"/>
+                </a:cxn>
+                <a:cxn ang="0">
+                  <a:pos x="connsiteX3" y="connsiteY3"/>
+                </a:cxn>
+              </a:cxnLst>
+              <a:rect l="l" t="t" r="r" b="b"/>
+              <a:pathLst>
+                <a:path w="128470" h="128446">
+                  <a:moveTo>
+                    <a:pt x="67941" y="-27"/>
+                  </a:moveTo>
+                  <a:lnTo>
+                    <a:pt x="128284" y="24963"/>
+                  </a:lnTo>
+                  <a:lnTo>
+                    <a:pt x="121175" y="128419"/>
+                  </a:lnTo>
+                  <a:lnTo>
+                    <a:pt x="-186" y="78149"/>
+                  </a:lnTo>
+                  <a:close/>
+                </a:path>
+              </a:pathLst>
+            </a:custGeom>
+            <a:solidFill>
+              <a:srgbClr val="727272"/>
+            </a:solidFill>
+            <a:ln w="8032" cap="flat">
+              <a:noFill/>
+              <a:prstDash val="solid"/>
+              <a:miter/>
+            </a:ln>
+          </p:spPr>
+          <p:txBody>
+            <a:bodyPr rtlCol="0" anchor="ctr"/>
+            <a:lstStyle/>
+            <a:p>
+              <a:endParaRPr lang="en-US">
+                <a:latin typeface="Gill Sans MT" panose="020B0502020104020203" pitchFamily="34" charset="77"/>
+              </a:endParaRPr>
+            </a:p>
+          </p:txBody>
+        </p:sp>
+        <p:sp>
+          <p:nvSpPr>
+            <p:cNvPr id="28" name="Freeform: Shape 468">
+              <a:extLst>
+                <a:ext uri="{FF2B5EF4-FFF2-40B4-BE49-F238E27FC236}">
+                  <a16:creationId xmlns:a16="http://schemas.microsoft.com/office/drawing/2014/main" id="{EAAE2B4E-1008-976F-9D8A-3E28AAA6876E}"/>
+                </a:ext>
+              </a:extLst>
+            </p:cNvPr>
+            <p:cNvSpPr/>
+            <p:nvPr/>
+          </p:nvSpPr>
+          <p:spPr>
+            <a:xfrm>
+              <a:off x="7199358" y="2289965"/>
+              <a:ext cx="128470" cy="128446"/>
+            </a:xfrm>
+            <a:custGeom>
+              <a:avLst/>
+              <a:gdLst>
+                <a:gd name="connsiteX0" fmla="*/ 128284 w 128470"/>
+                <a:gd name="connsiteY0" fmla="*/ 103421 h 128446"/>
+                <a:gd name="connsiteX1" fmla="*/ 67941 w 128470"/>
+                <a:gd name="connsiteY1" fmla="*/ 128419 h 128446"/>
+                <a:gd name="connsiteX2" fmla="*/ -186 w 128470"/>
+                <a:gd name="connsiteY2" fmla="*/ 50243 h 128446"/>
+                <a:gd name="connsiteX3" fmla="*/ 121175 w 128470"/>
+                <a:gd name="connsiteY3" fmla="*/ -27 h 128446"/>
+              </a:gdLst>
+              <a:ahLst/>
+              <a:cxnLst>
+                <a:cxn ang="0">
+                  <a:pos x="connsiteX0" y="connsiteY0"/>
+                </a:cxn>
+                <a:cxn ang="0">
+                  <a:pos x="connsiteX1" y="connsiteY1"/>
+                </a:cxn>
+                <a:cxn ang="0">
+                  <a:pos x="connsiteX2" y="connsiteY2"/>
+                </a:cxn>
+                <a:cxn ang="0">
+                  <a:pos x="connsiteX3" y="connsiteY3"/>
+                </a:cxn>
+              </a:cxnLst>
+              <a:rect l="l" t="t" r="r" b="b"/>
+              <a:pathLst>
+                <a:path w="128470" h="128446">
+                  <a:moveTo>
+                    <a:pt x="128284" y="103421"/>
+                  </a:moveTo>
+                  <a:lnTo>
+                    <a:pt x="67941" y="128419"/>
+                  </a:lnTo>
+                  <a:lnTo>
+                    <a:pt x="-186" y="50243"/>
+                  </a:lnTo>
+                  <a:lnTo>
+                    <a:pt x="121175" y="-27"/>
+                  </a:lnTo>
+                  <a:close/>
+                </a:path>
+              </a:pathLst>
+            </a:custGeom>
+            <a:solidFill>
+              <a:srgbClr val="727272"/>
+            </a:solidFill>
+            <a:ln w="8032" cap="flat">
+              <a:noFill/>
+              <a:prstDash val="solid"/>
+              <a:miter/>
+            </a:ln>
+          </p:spPr>
+          <p:txBody>
+            <a:bodyPr rtlCol="0" anchor="ctr"/>
+            <a:lstStyle/>
+            <a:p>
+              <a:endParaRPr lang="en-US">
+                <a:latin typeface="Gill Sans MT" panose="020B0502020104020203" pitchFamily="34" charset="77"/>
+              </a:endParaRPr>
+            </a:p>
+          </p:txBody>
+        </p:sp>
+        <p:sp>
+          <p:nvSpPr>
+            <p:cNvPr id="29" name="Freeform: Shape 469">
+              <a:extLst>
+                <a:ext uri="{FF2B5EF4-FFF2-40B4-BE49-F238E27FC236}">
+                  <a16:creationId xmlns:a16="http://schemas.microsoft.com/office/drawing/2014/main" id="{EB7780A6-3403-4487-6DF0-59E758EB1657}"/>
+                </a:ext>
+              </a:extLst>
+            </p:cNvPr>
+            <p:cNvSpPr/>
+            <p:nvPr/>
+          </p:nvSpPr>
+          <p:spPr>
+            <a:xfrm>
+              <a:off x="7023172" y="2289965"/>
+              <a:ext cx="128462" cy="128446"/>
+            </a:xfrm>
+            <a:custGeom>
+              <a:avLst/>
+              <a:gdLst>
+                <a:gd name="connsiteX0" fmla="*/ 60150 w 128462"/>
+                <a:gd name="connsiteY0" fmla="*/ 128419 h 128446"/>
+                <a:gd name="connsiteX1" fmla="*/ -186 w 128462"/>
+                <a:gd name="connsiteY1" fmla="*/ 103421 h 128446"/>
+                <a:gd name="connsiteX2" fmla="*/ 6915 w 128462"/>
+                <a:gd name="connsiteY2" fmla="*/ -27 h 128446"/>
+                <a:gd name="connsiteX3" fmla="*/ 128276 w 128462"/>
+                <a:gd name="connsiteY3" fmla="*/ 50243 h 128446"/>
+              </a:gdLst>
+              <a:ahLst/>
+              <a:cxnLst>
+                <a:cxn ang="0">
+                  <a:pos x="connsiteX0" y="connsiteY0"/>
+                </a:cxn>
+                <a:cxn ang="0">
+                  <a:pos x="connsiteX1" y="connsiteY1"/>
+                </a:cxn>
+                <a:cxn ang="0">
+                  <a:pos x="connsiteX2" y="connsiteY2"/>
+                </a:cxn>
+                <a:cxn ang="0">
+                  <a:pos x="connsiteX3" y="connsiteY3"/>
+                </a:cxn>
+              </a:cxnLst>
+              <a:rect l="l" t="t" r="r" b="b"/>
+              <a:pathLst>
+                <a:path w="128462" h="128446">
+                  <a:moveTo>
+                    <a:pt x="60150" y="128419"/>
+                  </a:moveTo>
+                  <a:lnTo>
+                    <a:pt x="-186" y="103421"/>
+                  </a:lnTo>
+                  <a:lnTo>
+                    <a:pt x="6915" y="-27"/>
+                  </a:lnTo>
+                  <a:lnTo>
+                    <a:pt x="128276" y="50243"/>
+                  </a:lnTo>
+                  <a:close/>
+                </a:path>
+              </a:pathLst>
+            </a:custGeom>
+            <a:solidFill>
+              <a:srgbClr val="727272"/>
+            </a:solidFill>
+            <a:ln w="8032" cap="flat">
+              <a:noFill/>
+              <a:prstDash val="solid"/>
+              <a:miter/>
+            </a:ln>
+          </p:spPr>
+          <p:txBody>
+            <a:bodyPr rtlCol="0" anchor="ctr"/>
+            <a:lstStyle/>
+            <a:p>
+              <a:endParaRPr lang="en-US">
+                <a:latin typeface="Gill Sans MT" panose="020B0502020104020203" pitchFamily="34" charset="77"/>
+              </a:endParaRPr>
+            </a:p>
+          </p:txBody>
+        </p:sp>
+        <p:sp>
+          <p:nvSpPr>
+            <p:cNvPr id="30" name="Freeform: Shape 470">
+              <a:extLst>
+                <a:ext uri="{FF2B5EF4-FFF2-40B4-BE49-F238E27FC236}">
+                  <a16:creationId xmlns:a16="http://schemas.microsoft.com/office/drawing/2014/main" id="{B37902A4-94D9-3529-7AC7-6E08F4AF00AC}"/>
+                </a:ext>
+              </a:extLst>
+            </p:cNvPr>
+            <p:cNvSpPr/>
+            <p:nvPr/>
+          </p:nvSpPr>
+          <p:spPr>
+            <a:xfrm>
+              <a:off x="7349855" y="1961644"/>
+              <a:ext cx="128446" cy="128462"/>
+            </a:xfrm>
+            <a:custGeom>
+              <a:avLst/>
+              <a:gdLst>
+                <a:gd name="connsiteX0" fmla="*/ 103262 w 128446"/>
+                <a:gd name="connsiteY0" fmla="*/ -27 h 128462"/>
+                <a:gd name="connsiteX1" fmla="*/ 128260 w 128446"/>
+                <a:gd name="connsiteY1" fmla="*/ 60308 h 128462"/>
+                <a:gd name="connsiteX2" fmla="*/ 50084 w 128446"/>
+                <a:gd name="connsiteY2" fmla="*/ 128435 h 128462"/>
+                <a:gd name="connsiteX3" fmla="*/ -186 w 128446"/>
+                <a:gd name="connsiteY3" fmla="*/ 7074 h 128462"/>
+              </a:gdLst>
+              <a:ahLst/>
+              <a:cxnLst>
+                <a:cxn ang="0">
+                  <a:pos x="connsiteX0" y="connsiteY0"/>
+                </a:cxn>
+                <a:cxn ang="0">
+                  <a:pos x="connsiteX1" y="connsiteY1"/>
+                </a:cxn>
+                <a:cxn ang="0">
+                  <a:pos x="connsiteX2" y="connsiteY2"/>
+                </a:cxn>
+                <a:cxn ang="0">
+                  <a:pos x="connsiteX3" y="connsiteY3"/>
+                </a:cxn>
+              </a:cxnLst>
+              <a:rect l="l" t="t" r="r" b="b"/>
+              <a:pathLst>
+                <a:path w="128446" h="128462">
+                  <a:moveTo>
+                    <a:pt x="103262" y="-27"/>
+                  </a:moveTo>
+                  <a:lnTo>
+                    <a:pt x="128260" y="60308"/>
+                  </a:lnTo>
+                  <a:lnTo>
+                    <a:pt x="50084" y="128435"/>
+                  </a:lnTo>
+                  <a:lnTo>
+                    <a:pt x="-186" y="7074"/>
+                  </a:lnTo>
+                  <a:close/>
+                </a:path>
+              </a:pathLst>
+            </a:custGeom>
+            <a:solidFill>
+              <a:srgbClr val="727272"/>
+            </a:solidFill>
+            <a:ln w="8032" cap="flat">
+              <a:noFill/>
+              <a:prstDash val="solid"/>
+              <a:miter/>
+            </a:ln>
+          </p:spPr>
+          <p:txBody>
+            <a:bodyPr rtlCol="0" anchor="ctr"/>
+            <a:lstStyle/>
+            <a:p>
+              <a:endParaRPr lang="en-US">
+                <a:latin typeface="Gill Sans MT" panose="020B0502020104020203" pitchFamily="34" charset="77"/>
+              </a:endParaRPr>
+            </a:p>
+          </p:txBody>
+        </p:sp>
+        <p:sp>
+          <p:nvSpPr>
+            <p:cNvPr id="31" name="Freeform: Shape 471">
+              <a:extLst>
+                <a:ext uri="{FF2B5EF4-FFF2-40B4-BE49-F238E27FC236}">
+                  <a16:creationId xmlns:a16="http://schemas.microsoft.com/office/drawing/2014/main" id="{F10C86EF-E990-74F1-7887-286C9D3BE4B9}"/>
+                </a:ext>
+              </a:extLst>
+            </p:cNvPr>
+            <p:cNvSpPr/>
+            <p:nvPr/>
+          </p:nvSpPr>
+          <p:spPr>
+            <a:xfrm>
+              <a:off x="7349855" y="2135155"/>
+              <a:ext cx="128446" cy="128462"/>
+            </a:xfrm>
+            <a:custGeom>
+              <a:avLst/>
+              <a:gdLst>
+                <a:gd name="connsiteX0" fmla="*/ 128260 w 128446"/>
+                <a:gd name="connsiteY0" fmla="*/ 68100 h 128462"/>
+                <a:gd name="connsiteX1" fmla="*/ 103262 w 128446"/>
+                <a:gd name="connsiteY1" fmla="*/ 128435 h 128462"/>
+                <a:gd name="connsiteX2" fmla="*/ -186 w 128446"/>
+                <a:gd name="connsiteY2" fmla="*/ 121334 h 128462"/>
+                <a:gd name="connsiteX3" fmla="*/ 50084 w 128446"/>
+                <a:gd name="connsiteY3" fmla="*/ -27 h 128462"/>
+              </a:gdLst>
+              <a:ahLst/>
+              <a:cxnLst>
+                <a:cxn ang="0">
+                  <a:pos x="connsiteX0" y="connsiteY0"/>
+                </a:cxn>
+                <a:cxn ang="0">
+                  <a:pos x="connsiteX1" y="connsiteY1"/>
+                </a:cxn>
+                <a:cxn ang="0">
+                  <a:pos x="connsiteX2" y="connsiteY2"/>
+                </a:cxn>
+                <a:cxn ang="0">
+                  <a:pos x="connsiteX3" y="connsiteY3"/>
+                </a:cxn>
+              </a:cxnLst>
+              <a:rect l="l" t="t" r="r" b="b"/>
+              <a:pathLst>
+                <a:path w="128446" h="128462">
+                  <a:moveTo>
+                    <a:pt x="128260" y="68100"/>
+                  </a:moveTo>
+                  <a:lnTo>
+                    <a:pt x="103262" y="128435"/>
+                  </a:lnTo>
+                  <a:lnTo>
+                    <a:pt x="-186" y="121334"/>
+                  </a:lnTo>
+                  <a:lnTo>
+                    <a:pt x="50084" y="-27"/>
+                  </a:lnTo>
+                  <a:close/>
+                </a:path>
+              </a:pathLst>
+            </a:custGeom>
+            <a:solidFill>
+              <a:srgbClr val="727272"/>
+            </a:solidFill>
+            <a:ln w="8032" cap="flat">
+              <a:noFill/>
+              <a:prstDash val="solid"/>
+              <a:miter/>
+            </a:ln>
+          </p:spPr>
+          <p:txBody>
+            <a:bodyPr rtlCol="0" anchor="ctr"/>
+            <a:lstStyle/>
+            <a:p>
+              <a:endParaRPr lang="en-US">
+                <a:latin typeface="Gill Sans MT" panose="020B0502020104020203" pitchFamily="34" charset="77"/>
+              </a:endParaRPr>
+            </a:p>
+          </p:txBody>
+        </p:sp>
+        <p:sp>
+          <p:nvSpPr>
+            <p:cNvPr id="32" name="Freeform: Shape 472">
+              <a:extLst>
+                <a:ext uri="{FF2B5EF4-FFF2-40B4-BE49-F238E27FC236}">
+                  <a16:creationId xmlns:a16="http://schemas.microsoft.com/office/drawing/2014/main" id="{6F9BB02C-FD01-862D-A36D-B1FE12A14E01}"/>
+                </a:ext>
+              </a:extLst>
+            </p:cNvPr>
+            <p:cNvSpPr/>
+            <p:nvPr/>
+          </p:nvSpPr>
+          <p:spPr>
+            <a:xfrm>
+              <a:off x="6869760" y="2135155"/>
+              <a:ext cx="128437" cy="128462"/>
+            </a:xfrm>
+            <a:custGeom>
+              <a:avLst/>
+              <a:gdLst>
+                <a:gd name="connsiteX0" fmla="*/ 24804 w 128437"/>
+                <a:gd name="connsiteY0" fmla="*/ 128435 h 128462"/>
+                <a:gd name="connsiteX1" fmla="*/ -186 w 128437"/>
+                <a:gd name="connsiteY1" fmla="*/ 68100 h 128462"/>
+                <a:gd name="connsiteX2" fmla="*/ 77982 w 128437"/>
+                <a:gd name="connsiteY2" fmla="*/ -27 h 128462"/>
+                <a:gd name="connsiteX3" fmla="*/ 128252 w 128437"/>
+                <a:gd name="connsiteY3" fmla="*/ 121334 h 128462"/>
+              </a:gdLst>
+              <a:ahLst/>
+              <a:cxnLst>
+                <a:cxn ang="0">
+                  <a:pos x="connsiteX0" y="connsiteY0"/>
+                </a:cxn>
+                <a:cxn ang="0">
+                  <a:pos x="connsiteX1" y="connsiteY1"/>
+                </a:cxn>
+                <a:cxn ang="0">
+                  <a:pos x="connsiteX2" y="connsiteY2"/>
+                </a:cxn>
+                <a:cxn ang="0">
+                  <a:pos x="connsiteX3" y="connsiteY3"/>
+                </a:cxn>
+              </a:cxnLst>
+              <a:rect l="l" t="t" r="r" b="b"/>
+              <a:pathLst>
+                <a:path w="128437" h="128462">
+                  <a:moveTo>
+                    <a:pt x="24804" y="128435"/>
+                  </a:moveTo>
+                  <a:lnTo>
+                    <a:pt x="-186" y="68100"/>
+                  </a:lnTo>
+                  <a:lnTo>
+                    <a:pt x="77982" y="-27"/>
+                  </a:lnTo>
+                  <a:lnTo>
+                    <a:pt x="128252" y="121334"/>
+                  </a:lnTo>
+                  <a:close/>
+                </a:path>
+              </a:pathLst>
+            </a:custGeom>
+            <a:solidFill>
+              <a:srgbClr val="727272"/>
+            </a:solidFill>
+            <a:ln w="8032" cap="flat">
+              <a:noFill/>
+              <a:prstDash val="solid"/>
+              <a:miter/>
+            </a:ln>
+          </p:spPr>
+          <p:txBody>
+            <a:bodyPr rtlCol="0" anchor="ctr"/>
+            <a:lstStyle/>
+            <a:p>
+              <a:endParaRPr lang="en-US">
+                <a:latin typeface="Gill Sans MT" panose="020B0502020104020203" pitchFamily="34" charset="77"/>
+              </a:endParaRPr>
+            </a:p>
+          </p:txBody>
+        </p:sp>
+        <p:sp>
+          <p:nvSpPr>
+            <p:cNvPr id="33" name="Freeform: Shape 473">
+              <a:extLst>
+                <a:ext uri="{FF2B5EF4-FFF2-40B4-BE49-F238E27FC236}">
+                  <a16:creationId xmlns:a16="http://schemas.microsoft.com/office/drawing/2014/main" id="{8717FFE7-A433-1459-A8C4-100A22F00200}"/>
+                </a:ext>
+              </a:extLst>
+            </p:cNvPr>
+            <p:cNvSpPr/>
+            <p:nvPr/>
+          </p:nvSpPr>
+          <p:spPr>
+            <a:xfrm>
+              <a:off x="6869760" y="1961644"/>
+              <a:ext cx="128437" cy="128462"/>
+            </a:xfrm>
+            <a:custGeom>
+              <a:avLst/>
+              <a:gdLst>
+                <a:gd name="connsiteX0" fmla="*/ -186 w 128437"/>
+                <a:gd name="connsiteY0" fmla="*/ 60308 h 128462"/>
+                <a:gd name="connsiteX1" fmla="*/ 24804 w 128437"/>
+                <a:gd name="connsiteY1" fmla="*/ -27 h 128462"/>
+                <a:gd name="connsiteX2" fmla="*/ 128252 w 128437"/>
+                <a:gd name="connsiteY2" fmla="*/ 7074 h 128462"/>
+                <a:gd name="connsiteX3" fmla="*/ 77982 w 128437"/>
+                <a:gd name="connsiteY3" fmla="*/ 128435 h 128462"/>
+              </a:gdLst>
+              <a:ahLst/>
+              <a:cxnLst>
+                <a:cxn ang="0">
+                  <a:pos x="connsiteX0" y="connsiteY0"/>
+                </a:cxn>
+                <a:cxn ang="0">
+                  <a:pos x="connsiteX1" y="connsiteY1"/>
+                </a:cxn>
+                <a:cxn ang="0">
+                  <a:pos x="connsiteX2" y="connsiteY2"/>
+                </a:cxn>
+                <a:cxn ang="0">
+                  <a:pos x="connsiteX3" y="connsiteY3"/>
+                </a:cxn>
+              </a:cxnLst>
+              <a:rect l="l" t="t" r="r" b="b"/>
+              <a:pathLst>
+                <a:path w="128437" h="128462">
+                  <a:moveTo>
+                    <a:pt x="-186" y="60308"/>
+                  </a:moveTo>
+                  <a:lnTo>
+                    <a:pt x="24804" y="-27"/>
+                  </a:lnTo>
+                  <a:lnTo>
+                    <a:pt x="128252" y="7074"/>
+                  </a:lnTo>
+                  <a:lnTo>
+                    <a:pt x="77982" y="128435"/>
+                  </a:lnTo>
+                  <a:close/>
+                </a:path>
+              </a:pathLst>
+            </a:custGeom>
+            <a:solidFill>
+              <a:srgbClr val="727272"/>
+            </a:solidFill>
+            <a:ln w="8032" cap="flat">
+              <a:noFill/>
+              <a:prstDash val="solid"/>
+              <a:miter/>
+            </a:ln>
+          </p:spPr>
+          <p:txBody>
+            <a:bodyPr rtlCol="0" anchor="ctr"/>
+            <a:lstStyle/>
+            <a:p>
+              <a:endParaRPr lang="en-US">
+                <a:latin typeface="Gill Sans MT" panose="020B0502020104020203" pitchFamily="34" charset="77"/>
+              </a:endParaRPr>
+            </a:p>
+          </p:txBody>
+        </p:sp>
+      </p:grpSp>
     </p:spTree>
     <p:extLst>
       <p:ext uri="{BB962C8B-B14F-4D97-AF65-F5344CB8AC3E}">
@@ -22339,10 +22338,10 @@
       </p:sp>
       <p:pic>
         <p:nvPicPr>
-          <p:cNvPr id="6" name="Graphic 5">
+          <p:cNvPr id="4" name="Graphic 3">
             <a:extLst>
               <a:ext uri="{FF2B5EF4-FFF2-40B4-BE49-F238E27FC236}">
-                <a16:creationId xmlns:a16="http://schemas.microsoft.com/office/drawing/2014/main" id="{DB1FD44E-C855-8851-C5DC-B208E62E1887}"/>
+                <a16:creationId xmlns:a16="http://schemas.microsoft.com/office/drawing/2014/main" id="{B1B0BB7A-B5E2-A715-6185-880CA6601309}"/>
               </a:ext>
             </a:extLst>
           </p:cNvPr>
@@ -22365,8 +22364,8 @@
         </p:blipFill>
         <p:spPr>
           <a:xfrm>
-            <a:off x="1488975" y="0"/>
-            <a:ext cx="6166049" cy="5143500"/>
+            <a:off x="1390831" y="-159026"/>
+            <a:ext cx="6312919" cy="5266014"/>
           </a:xfrm>
           <a:prstGeom prst="rect">
             <a:avLst/>
@@ -22387,107 +22386,6 @@
 </file>
 
 <file path=ppt/slides/slide12.xml><?xml version="1.0" encoding="utf-8"?>
-<p:sld xmlns:a="http://schemas.openxmlformats.org/drawingml/2006/main" xmlns:r="http://schemas.openxmlformats.org/officeDocument/2006/relationships" xmlns:p="http://schemas.openxmlformats.org/presentationml/2006/main">
-  <p:cSld>
-    <p:spTree>
-      <p:nvGrpSpPr>
-        <p:cNvPr id="1" name=""/>
-        <p:cNvGrpSpPr/>
-        <p:nvPr/>
-      </p:nvGrpSpPr>
-      <p:grpSpPr>
-        <a:xfrm>
-          <a:off x="0" y="0"/>
-          <a:ext cx="0" cy="0"/>
-          <a:chOff x="0" y="0"/>
-          <a:chExt cx="0" cy="0"/>
-        </a:xfrm>
-      </p:grpSpPr>
-      <p:sp>
-        <p:nvSpPr>
-          <p:cNvPr id="2" name="Title 1">
-            <a:extLst>
-              <a:ext uri="{FF2B5EF4-FFF2-40B4-BE49-F238E27FC236}">
-                <a16:creationId xmlns:a16="http://schemas.microsoft.com/office/drawing/2014/main" id="{CBE90987-DE25-014F-8A1B-9BCCA7C8B525}"/>
-              </a:ext>
-            </a:extLst>
-          </p:cNvPr>
-          <p:cNvSpPr>
-            <a:spLocks noGrp="1"/>
-          </p:cNvSpPr>
-          <p:nvPr>
-            <p:ph type="title"/>
-          </p:nvPr>
-        </p:nvSpPr>
-        <p:spPr>
-          <a:xfrm>
-            <a:off x="2234524" y="29000"/>
-            <a:ext cx="6843435" cy="572700"/>
-          </a:xfrm>
-        </p:spPr>
-        <p:txBody>
-          <a:bodyPr>
-            <a:normAutofit fontScale="90000"/>
-          </a:bodyPr>
-          <a:lstStyle/>
-          <a:p>
-            <a:r>
-              <a:rPr lang="en-US" dirty="0"/>
-              <a:t>Meta-Metamodel</a:t>
-            </a:r>
-          </a:p>
-        </p:txBody>
-      </p:sp>
-      <p:pic>
-        <p:nvPicPr>
-          <p:cNvPr id="7" name="Graphic 6">
-            <a:extLst>
-              <a:ext uri="{FF2B5EF4-FFF2-40B4-BE49-F238E27FC236}">
-                <a16:creationId xmlns:a16="http://schemas.microsoft.com/office/drawing/2014/main" id="{D980D2D1-71FA-C9E4-C942-FB835C586AF5}"/>
-              </a:ext>
-            </a:extLst>
-          </p:cNvPr>
-          <p:cNvPicPr>
-            <a:picLocks noChangeAspect="1"/>
-          </p:cNvPicPr>
-          <p:nvPr/>
-        </p:nvPicPr>
-        <p:blipFill>
-          <a:blip r:embed="rId2">
-            <a:extLst>
-              <a:ext uri="{96DAC541-7B7A-43D3-8B79-37D633B846F1}">
-                <asvg:svgBlip xmlns:asvg="http://schemas.microsoft.com/office/drawing/2016/SVG/main" r:embed="rId3"/>
-              </a:ext>
-            </a:extLst>
-          </a:blip>
-          <a:stretch>
-            <a:fillRect/>
-          </a:stretch>
-        </p:blipFill>
-        <p:spPr>
-          <a:xfrm>
-            <a:off x="132522" y="858716"/>
-            <a:ext cx="8787706" cy="3292570"/>
-          </a:xfrm>
-          <a:prstGeom prst="rect">
-            <a:avLst/>
-          </a:prstGeom>
-        </p:spPr>
-      </p:pic>
-    </p:spTree>
-    <p:extLst>
-      <p:ext uri="{BB962C8B-B14F-4D97-AF65-F5344CB8AC3E}">
-        <p14:creationId xmlns:p14="http://schemas.microsoft.com/office/powerpoint/2010/main" val="2216559347"/>
-      </p:ext>
-    </p:extLst>
-  </p:cSld>
-  <p:clrMapOvr>
-    <a:masterClrMapping/>
-  </p:clrMapOvr>
-</p:sld>
-</file>
-
-<file path=ppt/slides/slide13.xml><?xml version="1.0" encoding="utf-8"?>
 <p:sld xmlns:a="http://schemas.openxmlformats.org/drawingml/2006/main" xmlns:r="http://schemas.openxmlformats.org/officeDocument/2006/relationships" xmlns:p="http://schemas.openxmlformats.org/presentationml/2006/main">
   <p:cSld>
     <p:spTree>
@@ -22583,7 +22481,7 @@
 </p:sld>
 </file>
 
-<file path=ppt/slides/slide14.xml><?xml version="1.0" encoding="utf-8"?>
+<file path=ppt/slides/slide13.xml><?xml version="1.0" encoding="utf-8"?>
 <p:sld xmlns:a="http://schemas.openxmlformats.org/drawingml/2006/main" xmlns:r="http://schemas.openxmlformats.org/officeDocument/2006/relationships" xmlns:p="http://schemas.openxmlformats.org/presentationml/2006/main">
   <p:cSld>
     <p:spTree>
@@ -22641,7 +22539,7 @@
 </p:sld>
 </file>
 
-<file path=ppt/slides/slide15.xml><?xml version="1.0" encoding="utf-8"?>
+<file path=ppt/slides/slide14.xml><?xml version="1.0" encoding="utf-8"?>
 <p:sld xmlns:a="http://schemas.openxmlformats.org/drawingml/2006/main" xmlns:r="http://schemas.openxmlformats.org/officeDocument/2006/relationships" xmlns:p="http://schemas.openxmlformats.org/presentationml/2006/main">
   <p:cSld>
     <p:spTree>
@@ -24267,7 +24165,7 @@
 </p:sld>
 </file>
 
-<file path=ppt/slides/slide16.xml><?xml version="1.0" encoding="utf-8"?>
+<file path=ppt/slides/slide15.xml><?xml version="1.0" encoding="utf-8"?>
 <p:sld xmlns:a="http://schemas.openxmlformats.org/drawingml/2006/main" xmlns:r="http://schemas.openxmlformats.org/officeDocument/2006/relationships" xmlns:p="http://schemas.openxmlformats.org/presentationml/2006/main">
   <p:cSld>
     <p:spTree>
@@ -25652,7 +25550,7 @@
 </p:sld>
 </file>
 
-<file path=ppt/slides/slide17.xml><?xml version="1.0" encoding="utf-8"?>
+<file path=ppt/slides/slide16.xml><?xml version="1.0" encoding="utf-8"?>
 <p:sld xmlns:a="http://schemas.openxmlformats.org/drawingml/2006/main" xmlns:r="http://schemas.openxmlformats.org/officeDocument/2006/relationships" xmlns:p="http://schemas.openxmlformats.org/presentationml/2006/main" show="0">
   <p:cSld>
     <p:spTree>
@@ -25853,7 +25751,7 @@
 </p:sld>
 </file>
 
-<file path=ppt/slides/slide18.xml><?xml version="1.0" encoding="utf-8"?>
+<file path=ppt/slides/slide17.xml><?xml version="1.0" encoding="utf-8"?>
 <p:sld xmlns:a="http://schemas.openxmlformats.org/drawingml/2006/main" xmlns:r="http://schemas.openxmlformats.org/officeDocument/2006/relationships" xmlns:p="http://schemas.openxmlformats.org/presentationml/2006/main">
   <p:cSld>
     <p:spTree>
@@ -27815,7 +27713,7 @@
 </p:sld>
 </file>
 
-<file path=ppt/slides/slide19.xml><?xml version="1.0" encoding="utf-8"?>
+<file path=ppt/slides/slide18.xml><?xml version="1.0" encoding="utf-8"?>
 <p:sld xmlns:a="http://schemas.openxmlformats.org/drawingml/2006/main" xmlns:r="http://schemas.openxmlformats.org/officeDocument/2006/relationships" xmlns:p="http://schemas.openxmlformats.org/presentationml/2006/main" show="0">
   <p:cSld>
     <p:spTree>
@@ -29114,8 +29012,8 @@
         </p:nvSpPr>
         <p:spPr>
           <a:xfrm>
-            <a:off x="2326354" y="937059"/>
-            <a:ext cx="5997946" cy="1366386"/>
+            <a:off x="2326354" y="937058"/>
+            <a:ext cx="5997946" cy="1634691"/>
           </a:xfrm>
         </p:spPr>
         <p:txBody>
@@ -35339,560 +35237,6 @@
       </p:sp>
       <p:grpSp>
         <p:nvGrpSpPr>
-          <p:cNvPr id="441" name="Graphic 4">
-            <a:extLst>
-              <a:ext uri="{FF2B5EF4-FFF2-40B4-BE49-F238E27FC236}">
-                <a16:creationId xmlns:a16="http://schemas.microsoft.com/office/drawing/2014/main" id="{E7070A55-2055-1A57-0ADE-304A8781D32E}"/>
-              </a:ext>
-            </a:extLst>
-          </p:cNvPr>
-          <p:cNvGrpSpPr/>
-          <p:nvPr/>
-        </p:nvGrpSpPr>
-        <p:grpSpPr>
-          <a:xfrm>
-            <a:off x="5651260" y="2194740"/>
-            <a:ext cx="253003" cy="303686"/>
-            <a:chOff x="5607235" y="3335770"/>
-            <a:chExt cx="416899" cy="510435"/>
-          </a:xfrm>
-        </p:grpSpPr>
-        <p:sp>
-          <p:nvSpPr>
-            <p:cNvPr id="529" name="Freeform: Shape 528">
-              <a:extLst>
-                <a:ext uri="{FF2B5EF4-FFF2-40B4-BE49-F238E27FC236}">
-                  <a16:creationId xmlns:a16="http://schemas.microsoft.com/office/drawing/2014/main" id="{47B8BA3E-D6AA-3061-B2E1-8E67DC843923}"/>
-                </a:ext>
-              </a:extLst>
-            </p:cNvPr>
-            <p:cNvSpPr/>
-            <p:nvPr/>
-          </p:nvSpPr>
-          <p:spPr>
-            <a:xfrm>
-              <a:off x="5655577" y="3380746"/>
-              <a:ext cx="368557" cy="465458"/>
-            </a:xfrm>
-            <a:custGeom>
-              <a:avLst/>
-              <a:gdLst>
-                <a:gd name="connsiteX0" fmla="*/ 116918 w 368557"/>
-                <a:gd name="connsiteY0" fmla="*/ -27 h 465458"/>
-                <a:gd name="connsiteX1" fmla="*/ 368372 w 368557"/>
-                <a:gd name="connsiteY1" fmla="*/ -27 h 465458"/>
-                <a:gd name="connsiteX2" fmla="*/ 368372 w 368557"/>
-                <a:gd name="connsiteY2" fmla="*/ 465432 h 465458"/>
-                <a:gd name="connsiteX3" fmla="*/ -186 w 368557"/>
-                <a:gd name="connsiteY3" fmla="*/ 465432 h 465458"/>
-                <a:gd name="connsiteX4" fmla="*/ -186 w 368557"/>
-                <a:gd name="connsiteY4" fmla="*/ 115301 h 465458"/>
-              </a:gdLst>
-              <a:ahLst/>
-              <a:cxnLst>
-                <a:cxn ang="0">
-                  <a:pos x="connsiteX0" y="connsiteY0"/>
-                </a:cxn>
-                <a:cxn ang="0">
-                  <a:pos x="connsiteX1" y="connsiteY1"/>
-                </a:cxn>
-                <a:cxn ang="0">
-                  <a:pos x="connsiteX2" y="connsiteY2"/>
-                </a:cxn>
-                <a:cxn ang="0">
-                  <a:pos x="connsiteX3" y="connsiteY3"/>
-                </a:cxn>
-                <a:cxn ang="0">
-                  <a:pos x="connsiteX4" y="connsiteY4"/>
-                </a:cxn>
-              </a:cxnLst>
-              <a:rect l="l" t="t" r="r" b="b"/>
-              <a:pathLst>
-                <a:path w="368557" h="465458">
-                  <a:moveTo>
-                    <a:pt x="116918" y="-27"/>
-                  </a:moveTo>
-                  <a:lnTo>
-                    <a:pt x="368372" y="-27"/>
-                  </a:lnTo>
-                  <a:lnTo>
-                    <a:pt x="368372" y="465432"/>
-                  </a:lnTo>
-                  <a:lnTo>
-                    <a:pt x="-186" y="465432"/>
-                  </a:lnTo>
-                  <a:lnTo>
-                    <a:pt x="-186" y="115301"/>
-                  </a:lnTo>
-                  <a:close/>
-                </a:path>
-              </a:pathLst>
-            </a:custGeom>
-            <a:solidFill>
-              <a:srgbClr val="FFFFFF"/>
-            </a:solidFill>
-            <a:ln w="20882" cap="flat">
-              <a:solidFill>
-                <a:srgbClr val="727272"/>
-              </a:solidFill>
-              <a:prstDash val="solid"/>
-              <a:round/>
-            </a:ln>
-          </p:spPr>
-          <p:txBody>
-            <a:bodyPr rtlCol="0" anchor="ctr"/>
-            <a:lstStyle/>
-            <a:p>
-              <a:endParaRPr lang="en-US">
-                <a:latin typeface="Gill Sans MT" panose="020B0502020104020203" pitchFamily="34" charset="77"/>
-              </a:endParaRPr>
-            </a:p>
-          </p:txBody>
-        </p:sp>
-        <p:sp>
-          <p:nvSpPr>
-            <p:cNvPr id="530" name="Freeform: Shape 529">
-              <a:extLst>
-                <a:ext uri="{FF2B5EF4-FFF2-40B4-BE49-F238E27FC236}">
-                  <a16:creationId xmlns:a16="http://schemas.microsoft.com/office/drawing/2014/main" id="{536CFF19-312F-9346-D7B9-8716C566054F}"/>
-                </a:ext>
-              </a:extLst>
-            </p:cNvPr>
-            <p:cNvSpPr/>
-            <p:nvPr/>
-          </p:nvSpPr>
-          <p:spPr>
-            <a:xfrm>
-              <a:off x="5607235" y="3335770"/>
-              <a:ext cx="368557" cy="465458"/>
-            </a:xfrm>
-            <a:custGeom>
-              <a:avLst/>
-              <a:gdLst>
-                <a:gd name="connsiteX0" fmla="*/ 116918 w 368557"/>
-                <a:gd name="connsiteY0" fmla="*/ -27 h 465458"/>
-                <a:gd name="connsiteX1" fmla="*/ 368372 w 368557"/>
-                <a:gd name="connsiteY1" fmla="*/ -27 h 465458"/>
-                <a:gd name="connsiteX2" fmla="*/ 368372 w 368557"/>
-                <a:gd name="connsiteY2" fmla="*/ 465432 h 465458"/>
-                <a:gd name="connsiteX3" fmla="*/ -186 w 368557"/>
-                <a:gd name="connsiteY3" fmla="*/ 465432 h 465458"/>
-                <a:gd name="connsiteX4" fmla="*/ -186 w 368557"/>
-                <a:gd name="connsiteY4" fmla="*/ 115301 h 465458"/>
-              </a:gdLst>
-              <a:ahLst/>
-              <a:cxnLst>
-                <a:cxn ang="0">
-                  <a:pos x="connsiteX0" y="connsiteY0"/>
-                </a:cxn>
-                <a:cxn ang="0">
-                  <a:pos x="connsiteX1" y="connsiteY1"/>
-                </a:cxn>
-                <a:cxn ang="0">
-                  <a:pos x="connsiteX2" y="connsiteY2"/>
-                </a:cxn>
-                <a:cxn ang="0">
-                  <a:pos x="connsiteX3" y="connsiteY3"/>
-                </a:cxn>
-                <a:cxn ang="0">
-                  <a:pos x="connsiteX4" y="connsiteY4"/>
-                </a:cxn>
-              </a:cxnLst>
-              <a:rect l="l" t="t" r="r" b="b"/>
-              <a:pathLst>
-                <a:path w="368557" h="465458">
-                  <a:moveTo>
-                    <a:pt x="116918" y="-27"/>
-                  </a:moveTo>
-                  <a:lnTo>
-                    <a:pt x="368372" y="-27"/>
-                  </a:lnTo>
-                  <a:lnTo>
-                    <a:pt x="368372" y="465432"/>
-                  </a:lnTo>
-                  <a:lnTo>
-                    <a:pt x="-186" y="465432"/>
-                  </a:lnTo>
-                  <a:lnTo>
-                    <a:pt x="-186" y="115301"/>
-                  </a:lnTo>
-                  <a:close/>
-                </a:path>
-              </a:pathLst>
-            </a:custGeom>
-            <a:solidFill>
-              <a:srgbClr val="FFFFFF"/>
-            </a:solidFill>
-            <a:ln w="20882" cap="rnd">
-              <a:solidFill>
-                <a:srgbClr val="727272"/>
-              </a:solidFill>
-              <a:prstDash val="solid"/>
-              <a:round/>
-            </a:ln>
-          </p:spPr>
-          <p:txBody>
-            <a:bodyPr rtlCol="0" anchor="ctr"/>
-            <a:lstStyle/>
-            <a:p>
-              <a:endParaRPr lang="en-US">
-                <a:latin typeface="Gill Sans MT" panose="020B0502020104020203" pitchFamily="34" charset="77"/>
-              </a:endParaRPr>
-            </a:p>
-          </p:txBody>
-        </p:sp>
-        <p:sp>
-          <p:nvSpPr>
-            <p:cNvPr id="531" name="Freeform: Shape 530">
-              <a:extLst>
-                <a:ext uri="{FF2B5EF4-FFF2-40B4-BE49-F238E27FC236}">
-                  <a16:creationId xmlns:a16="http://schemas.microsoft.com/office/drawing/2014/main" id="{4027E109-56B2-5FED-C597-7B17E0BFD1C7}"/>
-                </a:ext>
-              </a:extLst>
-            </p:cNvPr>
-            <p:cNvSpPr/>
-            <p:nvPr/>
-          </p:nvSpPr>
-          <p:spPr>
-            <a:xfrm>
-              <a:off x="5607235" y="3335770"/>
-              <a:ext cx="117103" cy="115328"/>
-            </a:xfrm>
-            <a:custGeom>
-              <a:avLst/>
-              <a:gdLst>
-                <a:gd name="connsiteX0" fmla="*/ -186 w 117103"/>
-                <a:gd name="connsiteY0" fmla="*/ 115301 h 115328"/>
-                <a:gd name="connsiteX1" fmla="*/ 116918 w 117103"/>
-                <a:gd name="connsiteY1" fmla="*/ 115301 h 115328"/>
-                <a:gd name="connsiteX2" fmla="*/ 116918 w 117103"/>
-                <a:gd name="connsiteY2" fmla="*/ -27 h 115328"/>
-              </a:gdLst>
-              <a:ahLst/>
-              <a:cxnLst>
-                <a:cxn ang="0">
-                  <a:pos x="connsiteX0" y="connsiteY0"/>
-                </a:cxn>
-                <a:cxn ang="0">
-                  <a:pos x="connsiteX1" y="connsiteY1"/>
-                </a:cxn>
-                <a:cxn ang="0">
-                  <a:pos x="connsiteX2" y="connsiteY2"/>
-                </a:cxn>
-              </a:cxnLst>
-              <a:rect l="l" t="t" r="r" b="b"/>
-              <a:pathLst>
-                <a:path w="117103" h="115328">
-                  <a:moveTo>
-                    <a:pt x="-186" y="115301"/>
-                  </a:moveTo>
-                  <a:lnTo>
-                    <a:pt x="116918" y="115301"/>
-                  </a:lnTo>
-                  <a:lnTo>
-                    <a:pt x="116918" y="-27"/>
-                  </a:lnTo>
-                </a:path>
-              </a:pathLst>
-            </a:custGeom>
-            <a:noFill/>
-            <a:ln w="20882" cap="flat">
-              <a:solidFill>
-                <a:srgbClr val="727272"/>
-              </a:solidFill>
-              <a:prstDash val="solid"/>
-              <a:round/>
-            </a:ln>
-          </p:spPr>
-          <p:txBody>
-            <a:bodyPr rtlCol="0" anchor="ctr"/>
-            <a:lstStyle/>
-            <a:p>
-              <a:endParaRPr lang="en-US">
-                <a:latin typeface="Gill Sans MT" panose="020B0502020104020203" pitchFamily="34" charset="77"/>
-              </a:endParaRPr>
-            </a:p>
-          </p:txBody>
-        </p:sp>
-        <p:sp>
-          <p:nvSpPr>
-            <p:cNvPr id="532" name="Freeform: Shape 531">
-              <a:extLst>
-                <a:ext uri="{FF2B5EF4-FFF2-40B4-BE49-F238E27FC236}">
-                  <a16:creationId xmlns:a16="http://schemas.microsoft.com/office/drawing/2014/main" id="{577E9811-10D5-9A28-EF8F-B8994E5AA8C5}"/>
-                </a:ext>
-              </a:extLst>
-            </p:cNvPr>
-            <p:cNvSpPr/>
-            <p:nvPr/>
-          </p:nvSpPr>
-          <p:spPr>
-            <a:xfrm>
-              <a:off x="5671683" y="3733062"/>
-              <a:ext cx="239661" cy="8032"/>
-            </a:xfrm>
-            <a:custGeom>
-              <a:avLst/>
-              <a:gdLst>
-                <a:gd name="connsiteX0" fmla="*/ 239476 w 239661"/>
-                <a:gd name="connsiteY0" fmla="*/ -27 h 8032"/>
-                <a:gd name="connsiteX1" fmla="*/ -186 w 239661"/>
-                <a:gd name="connsiteY1" fmla="*/ -27 h 8032"/>
-              </a:gdLst>
-              <a:ahLst/>
-              <a:cxnLst>
-                <a:cxn ang="0">
-                  <a:pos x="connsiteX0" y="connsiteY0"/>
-                </a:cxn>
-                <a:cxn ang="0">
-                  <a:pos x="connsiteX1" y="connsiteY1"/>
-                </a:cxn>
-              </a:cxnLst>
-              <a:rect l="l" t="t" r="r" b="b"/>
-              <a:pathLst>
-                <a:path w="239661" h="8032">
-                  <a:moveTo>
-                    <a:pt x="239476" y="-27"/>
-                  </a:moveTo>
-                  <a:lnTo>
-                    <a:pt x="-186" y="-27"/>
-                  </a:lnTo>
-                </a:path>
-              </a:pathLst>
-            </a:custGeom>
-            <a:noFill/>
-            <a:ln w="20882" cap="rnd">
-              <a:solidFill>
-                <a:srgbClr val="727272"/>
-              </a:solidFill>
-              <a:prstDash val="solid"/>
-              <a:round/>
-            </a:ln>
-          </p:spPr>
-          <p:txBody>
-            <a:bodyPr rtlCol="0" anchor="ctr"/>
-            <a:lstStyle/>
-            <a:p>
-              <a:endParaRPr lang="en-US">
-                <a:latin typeface="Gill Sans MT" panose="020B0502020104020203" pitchFamily="34" charset="77"/>
-              </a:endParaRPr>
-            </a:p>
-          </p:txBody>
-        </p:sp>
-        <p:sp>
-          <p:nvSpPr>
-            <p:cNvPr id="533" name="Freeform: Shape 532">
-              <a:extLst>
-                <a:ext uri="{FF2B5EF4-FFF2-40B4-BE49-F238E27FC236}">
-                  <a16:creationId xmlns:a16="http://schemas.microsoft.com/office/drawing/2014/main" id="{67E93042-3DAF-9744-7E9E-9380C58D5246}"/>
-                </a:ext>
-              </a:extLst>
-            </p:cNvPr>
-            <p:cNvSpPr/>
-            <p:nvPr/>
-          </p:nvSpPr>
-          <p:spPr>
-            <a:xfrm>
-              <a:off x="5671683" y="3663151"/>
-              <a:ext cx="239661" cy="8032"/>
-            </a:xfrm>
-            <a:custGeom>
-              <a:avLst/>
-              <a:gdLst>
-                <a:gd name="connsiteX0" fmla="*/ 239476 w 239661"/>
-                <a:gd name="connsiteY0" fmla="*/ -27 h 8032"/>
-                <a:gd name="connsiteX1" fmla="*/ -186 w 239661"/>
-                <a:gd name="connsiteY1" fmla="*/ -27 h 8032"/>
-              </a:gdLst>
-              <a:ahLst/>
-              <a:cxnLst>
-                <a:cxn ang="0">
-                  <a:pos x="connsiteX0" y="connsiteY0"/>
-                </a:cxn>
-                <a:cxn ang="0">
-                  <a:pos x="connsiteX1" y="connsiteY1"/>
-                </a:cxn>
-              </a:cxnLst>
-              <a:rect l="l" t="t" r="r" b="b"/>
-              <a:pathLst>
-                <a:path w="239661" h="8032">
-                  <a:moveTo>
-                    <a:pt x="239476" y="-27"/>
-                  </a:moveTo>
-                  <a:lnTo>
-                    <a:pt x="-186" y="-27"/>
-                  </a:lnTo>
-                </a:path>
-              </a:pathLst>
-            </a:custGeom>
-            <a:noFill/>
-            <a:ln w="20882" cap="rnd">
-              <a:solidFill>
-                <a:srgbClr val="727272"/>
-              </a:solidFill>
-              <a:prstDash val="solid"/>
-              <a:round/>
-            </a:ln>
-          </p:spPr>
-          <p:txBody>
-            <a:bodyPr rtlCol="0" anchor="ctr"/>
-            <a:lstStyle/>
-            <a:p>
-              <a:endParaRPr lang="en-US">
-                <a:latin typeface="Gill Sans MT" panose="020B0502020104020203" pitchFamily="34" charset="77"/>
-              </a:endParaRPr>
-            </a:p>
-          </p:txBody>
-        </p:sp>
-        <p:sp>
-          <p:nvSpPr>
-            <p:cNvPr id="534" name="Freeform: Shape 533">
-              <a:extLst>
-                <a:ext uri="{FF2B5EF4-FFF2-40B4-BE49-F238E27FC236}">
-                  <a16:creationId xmlns:a16="http://schemas.microsoft.com/office/drawing/2014/main" id="{4E4435E4-35A0-EF49-96F0-A07621AA84E1}"/>
-                </a:ext>
-              </a:extLst>
-            </p:cNvPr>
-            <p:cNvSpPr/>
-            <p:nvPr/>
-          </p:nvSpPr>
-          <p:spPr>
-            <a:xfrm>
-              <a:off x="5671683" y="3593241"/>
-              <a:ext cx="239661" cy="8032"/>
-            </a:xfrm>
-            <a:custGeom>
-              <a:avLst/>
-              <a:gdLst>
-                <a:gd name="connsiteX0" fmla="*/ 239476 w 239661"/>
-                <a:gd name="connsiteY0" fmla="*/ -27 h 8032"/>
-                <a:gd name="connsiteX1" fmla="*/ 190298 w 239661"/>
-                <a:gd name="connsiteY1" fmla="*/ -27 h 8032"/>
-                <a:gd name="connsiteX2" fmla="*/ 147394 w 239661"/>
-                <a:gd name="connsiteY2" fmla="*/ -27 h 8032"/>
-                <a:gd name="connsiteX3" fmla="*/ -186 w 239661"/>
-                <a:gd name="connsiteY3" fmla="*/ -27 h 8032"/>
-              </a:gdLst>
-              <a:ahLst/>
-              <a:cxnLst>
-                <a:cxn ang="0">
-                  <a:pos x="connsiteX0" y="connsiteY0"/>
-                </a:cxn>
-                <a:cxn ang="0">
-                  <a:pos x="connsiteX1" y="connsiteY1"/>
-                </a:cxn>
-                <a:cxn ang="0">
-                  <a:pos x="connsiteX2" y="connsiteY2"/>
-                </a:cxn>
-                <a:cxn ang="0">
-                  <a:pos x="connsiteX3" y="connsiteY3"/>
-                </a:cxn>
-              </a:cxnLst>
-              <a:rect l="l" t="t" r="r" b="b"/>
-              <a:pathLst>
-                <a:path w="239661" h="8032">
-                  <a:moveTo>
-                    <a:pt x="239476" y="-27"/>
-                  </a:moveTo>
-                  <a:lnTo>
-                    <a:pt x="190298" y="-27"/>
-                  </a:lnTo>
-                  <a:moveTo>
-                    <a:pt x="147394" y="-27"/>
-                  </a:moveTo>
-                  <a:lnTo>
-                    <a:pt x="-186" y="-27"/>
-                  </a:lnTo>
-                </a:path>
-              </a:pathLst>
-            </a:custGeom>
-            <a:noFill/>
-            <a:ln w="20882" cap="rnd">
-              <a:solidFill>
-                <a:srgbClr val="727272"/>
-              </a:solidFill>
-              <a:prstDash val="solid"/>
-              <a:round/>
-            </a:ln>
-          </p:spPr>
-          <p:txBody>
-            <a:bodyPr rtlCol="0" anchor="ctr"/>
-            <a:lstStyle/>
-            <a:p>
-              <a:endParaRPr lang="en-US">
-                <a:latin typeface="Gill Sans MT" panose="020B0502020104020203" pitchFamily="34" charset="77"/>
-              </a:endParaRPr>
-            </a:p>
-          </p:txBody>
-        </p:sp>
-        <p:sp>
-          <p:nvSpPr>
-            <p:cNvPr id="535" name="Freeform: Shape 534">
-              <a:extLst>
-                <a:ext uri="{FF2B5EF4-FFF2-40B4-BE49-F238E27FC236}">
-                  <a16:creationId xmlns:a16="http://schemas.microsoft.com/office/drawing/2014/main" id="{F8A0B6DE-DFCA-39FE-B7DF-610D15ADE3BA}"/>
-                </a:ext>
-              </a:extLst>
-            </p:cNvPr>
-            <p:cNvSpPr/>
-            <p:nvPr/>
-          </p:nvSpPr>
-          <p:spPr>
-            <a:xfrm>
-              <a:off x="5671683" y="3523331"/>
-              <a:ext cx="239661" cy="8032"/>
-            </a:xfrm>
-            <a:custGeom>
-              <a:avLst/>
-              <a:gdLst>
-                <a:gd name="connsiteX0" fmla="*/ 239476 w 239661"/>
-                <a:gd name="connsiteY0" fmla="*/ -27 h 8032"/>
-                <a:gd name="connsiteX1" fmla="*/ -186 w 239661"/>
-                <a:gd name="connsiteY1" fmla="*/ -27 h 8032"/>
-              </a:gdLst>
-              <a:ahLst/>
-              <a:cxnLst>
-                <a:cxn ang="0">
-                  <a:pos x="connsiteX0" y="connsiteY0"/>
-                </a:cxn>
-                <a:cxn ang="0">
-                  <a:pos x="connsiteX1" y="connsiteY1"/>
-                </a:cxn>
-              </a:cxnLst>
-              <a:rect l="l" t="t" r="r" b="b"/>
-              <a:pathLst>
-                <a:path w="239661" h="8032">
-                  <a:moveTo>
-                    <a:pt x="239476" y="-27"/>
-                  </a:moveTo>
-                  <a:lnTo>
-                    <a:pt x="-186" y="-27"/>
-                  </a:lnTo>
-                </a:path>
-              </a:pathLst>
-            </a:custGeom>
-            <a:noFill/>
-            <a:ln w="20882" cap="rnd">
-              <a:solidFill>
-                <a:srgbClr val="727272"/>
-              </a:solidFill>
-              <a:prstDash val="solid"/>
-              <a:round/>
-            </a:ln>
-          </p:spPr>
-          <p:txBody>
-            <a:bodyPr rtlCol="0" anchor="ctr"/>
-            <a:lstStyle/>
-            <a:p>
-              <a:endParaRPr lang="en-US">
-                <a:latin typeface="Gill Sans MT" panose="020B0502020104020203" pitchFamily="34" charset="77"/>
-              </a:endParaRPr>
-            </a:p>
-          </p:txBody>
-        </p:sp>
-      </p:grpSp>
-      <p:grpSp>
-        <p:nvGrpSpPr>
           <p:cNvPr id="442" name="Graphic 4">
             <a:extLst>
               <a:ext uri="{FF2B5EF4-FFF2-40B4-BE49-F238E27FC236}">
@@ -42750,7 +42094,7 @@
         <p:spPr>
           <a:xfrm>
             <a:off x="6340579" y="3018572"/>
-            <a:ext cx="2734301" cy="1883562"/>
+            <a:ext cx="2734301" cy="1671961"/>
           </a:xfrm>
           <a:prstGeom prst="rect">
             <a:avLst/>
@@ -42762,7 +42106,7 @@
         </p:spPr>
         <p:txBody>
           <a:bodyPr spcFirstLastPara="1" wrap="square" lIns="91425" tIns="91425" rIns="91425" bIns="91425" anchor="t" anchorCtr="0">
-            <a:spAutoFit/>
+            <a:noAutofit/>
           </a:bodyPr>
           <a:lstStyle>
             <a:defPPr marR="0" lvl="0" algn="l" rtl="0">
@@ -43032,6 +42376,9 @@
           </a:p>
           <a:p>
             <a:pPr marL="606425" lvl="1" indent="0">
+              <a:lnSpc>
+                <a:spcPct val="125000"/>
+              </a:lnSpc>
               <a:buClr>
                 <a:srgbClr val="1F2328"/>
               </a:buClr>
@@ -43056,31 +42403,10 @@
             </a:endParaRPr>
           </a:p>
           <a:p>
-            <a:pPr marL="149225" indent="0">
-              <a:buClr>
-                <a:srgbClr val="1F2328"/>
-              </a:buClr>
-              <a:buSzPts val="1250"/>
-              <a:buNone/>
-            </a:pPr>
-            <a:r>
-              <a:rPr lang="en-US" dirty="0">
-                <a:solidFill>
-                  <a:srgbClr val="1F2328"/>
-                </a:solidFill>
-                <a:latin typeface="Gill Sans MT" panose="020B0502020104020203" pitchFamily="34" charset="77"/>
-              </a:rPr>
-              <a:t>Processors</a:t>
-            </a:r>
-            <a:endParaRPr lang="en-US" sz="2200" dirty="0">
-              <a:solidFill>
-                <a:srgbClr val="1F2328"/>
-              </a:solidFill>
-              <a:latin typeface="Gill Sans MT" panose="020B0502020104020203" pitchFamily="34" charset="77"/>
-            </a:endParaRPr>
-          </a:p>
-          <a:p>
             <a:pPr marL="606425" lvl="1" indent="0">
+              <a:lnSpc>
+                <a:spcPct val="125000"/>
+              </a:lnSpc>
               <a:buClr>
                 <a:srgbClr val="1F2328"/>
               </a:buClr>
@@ -43099,6 +42425,9 @@
           </a:p>
           <a:p>
             <a:pPr marL="606425" lvl="1" indent="0">
+              <a:lnSpc>
+                <a:spcPct val="125000"/>
+              </a:lnSpc>
               <a:buClr>
                 <a:srgbClr val="1F2328"/>
               </a:buClr>
@@ -43117,6 +42446,9 @@
           </a:p>
           <a:p>
             <a:pPr marL="606425" lvl="1" indent="0">
+              <a:lnSpc>
+                <a:spcPct val="125000"/>
+              </a:lnSpc>
               <a:buClr>
                 <a:srgbClr val="1F2328"/>
               </a:buClr>
@@ -43447,7 +42779,7 @@
         </p:nvSpPr>
         <p:spPr>
           <a:xfrm>
-            <a:off x="6686453" y="4005006"/>
+            <a:off x="6686453" y="3716911"/>
             <a:ext cx="200594" cy="218748"/>
           </a:xfrm>
           <a:prstGeom prst="rect">
@@ -43565,7 +42897,7 @@
         </p:nvSpPr>
         <p:spPr>
           <a:xfrm>
-            <a:off x="6686453" y="4261427"/>
+            <a:off x="6686453" y="3973332"/>
             <a:ext cx="200594" cy="218748"/>
           </a:xfrm>
           <a:prstGeom prst="rect">
@@ -43683,7 +43015,7 @@
         </p:nvSpPr>
         <p:spPr>
           <a:xfrm>
-            <a:off x="6686453" y="4517848"/>
+            <a:off x="6686453" y="4229753"/>
             <a:ext cx="200594" cy="218748"/>
           </a:xfrm>
           <a:prstGeom prst="rect">

</xml_diff>

<commit_message>
added slide with PROPS metamodel
</commit_message>
<xml_diff>
--- a/resources/LangDev Talk.pptx
+++ b/resources/LangDev Talk.pptx
@@ -5,7 +5,7 @@
     <p:sldMasterId id="2147483659" r:id="rId1"/>
   </p:sldMasterIdLst>
   <p:notesMasterIdLst>
-    <p:notesMasterId r:id="rId20"/>
+    <p:notesMasterId r:id="rId22"/>
   </p:notesMasterIdLst>
   <p:sldIdLst>
     <p:sldId id="266" r:id="rId2"/>
@@ -21,32 +21,41 @@
     <p:sldId id="296" r:id="rId12"/>
     <p:sldId id="277" r:id="rId13"/>
     <p:sldId id="285" r:id="rId14"/>
-    <p:sldId id="292" r:id="rId15"/>
-    <p:sldId id="290" r:id="rId16"/>
-    <p:sldId id="263" r:id="rId17"/>
-    <p:sldId id="287" r:id="rId18"/>
-    <p:sldId id="265" r:id="rId19"/>
+    <p:sldId id="297" r:id="rId15"/>
+    <p:sldId id="298" r:id="rId16"/>
+    <p:sldId id="292" r:id="rId17"/>
+    <p:sldId id="290" r:id="rId18"/>
+    <p:sldId id="263" r:id="rId19"/>
+    <p:sldId id="287" r:id="rId20"/>
+    <p:sldId id="265" r:id="rId21"/>
   </p:sldIdLst>
   <p:sldSz cx="9144000" cy="5143500" type="screen16x9"/>
   <p:notesSz cx="6858000" cy="9144000"/>
   <p:embeddedFontLst>
     <p:embeddedFont>
-      <p:font typeface="Bauhaus 93"/>
-      <p:regular r:id="rId21"/>
+      <p:font typeface="Bauhaus 93" panose="04030905020B02020C02" pitchFamily="82" charset="0"/>
+      <p:regular r:id="rId23"/>
     </p:embeddedFont>
     <p:embeddedFont>
       <p:font typeface="Calibri" panose="020F0502020204030204" pitchFamily="34" charset="0"/>
-      <p:regular r:id="rId22"/>
-      <p:bold r:id="rId23"/>
-      <p:italic r:id="rId24"/>
-      <p:boldItalic r:id="rId25"/>
+      <p:regular r:id="rId24"/>
+      <p:bold r:id="rId25"/>
+      <p:italic r:id="rId26"/>
+      <p:boldItalic r:id="rId27"/>
     </p:embeddedFont>
     <p:embeddedFont>
-      <p:font typeface="Gill Sans MT" panose="020B0502020104020203" pitchFamily="34" charset="77"/>
-      <p:regular r:id="rId26"/>
-      <p:bold r:id="rId27"/>
-      <p:italic r:id="rId28"/>
-      <p:boldItalic r:id="rId29"/>
+      <p:font typeface="Consolas" panose="020B0609020204030204" pitchFamily="49" charset="0"/>
+      <p:regular r:id="rId28"/>
+      <p:bold r:id="rId29"/>
+      <p:italic r:id="rId30"/>
+      <p:boldItalic r:id="rId31"/>
+    </p:embeddedFont>
+    <p:embeddedFont>
+      <p:font typeface="Gill Sans MT" panose="020B0502020104020203" pitchFamily="34" charset="0"/>
+      <p:regular r:id="rId32"/>
+      <p:bold r:id="rId33"/>
+      <p:italic r:id="rId34"/>
+      <p:boldItalic r:id="rId35"/>
     </p:embeddedFont>
   </p:embeddedFontLst>
   <p:defaultTextStyle>
@@ -22558,6 +22567,318 @@
       </p:grpSpPr>
       <p:sp>
         <p:nvSpPr>
+          <p:cNvPr id="2" name="Title 1">
+            <a:extLst>
+              <a:ext uri="{FF2B5EF4-FFF2-40B4-BE49-F238E27FC236}">
+                <a16:creationId xmlns:a16="http://schemas.microsoft.com/office/drawing/2014/main" id="{63598517-E4C1-22FD-0B9D-556ADA872414}"/>
+              </a:ext>
+            </a:extLst>
+          </p:cNvPr>
+          <p:cNvSpPr>
+            <a:spLocks noGrp="1"/>
+          </p:cNvSpPr>
+          <p:nvPr>
+            <p:ph type="title"/>
+          </p:nvPr>
+        </p:nvSpPr>
+        <p:spPr/>
+        <p:txBody>
+          <a:bodyPr>
+            <a:normAutofit fontScale="90000"/>
+          </a:bodyPr>
+          <a:lstStyle/>
+          <a:p>
+            <a:r>
+              <a:rPr lang="en-US" dirty="0"/>
+              <a:t>Example Metamodel: PROPS Language</a:t>
+            </a:r>
+            <a:endParaRPr lang="en-NL" dirty="0"/>
+          </a:p>
+        </p:txBody>
+      </p:sp>
+      <p:pic>
+        <p:nvPicPr>
+          <p:cNvPr id="5" name="Graphic 4">
+            <a:extLst>
+              <a:ext uri="{FF2B5EF4-FFF2-40B4-BE49-F238E27FC236}">
+                <a16:creationId xmlns:a16="http://schemas.microsoft.com/office/drawing/2014/main" id="{7CEBA3A2-9340-8002-ECA0-23D77290C6A0}"/>
+              </a:ext>
+            </a:extLst>
+          </p:cNvPr>
+          <p:cNvPicPr>
+            <a:picLocks noChangeAspect="1"/>
+          </p:cNvPicPr>
+          <p:nvPr/>
+        </p:nvPicPr>
+        <p:blipFill>
+          <a:blip r:embed="rId2">
+            <a:extLst>
+              <a:ext uri="{96DAC541-7B7A-43D3-8B79-37D633B846F1}">
+                <asvg:svgBlip xmlns:asvg="http://schemas.microsoft.com/office/drawing/2016/SVG/main" r:embed="rId3"/>
+              </a:ext>
+            </a:extLst>
+          </a:blip>
+          <a:stretch>
+            <a:fillRect/>
+          </a:stretch>
+        </p:blipFill>
+        <p:spPr>
+          <a:xfrm>
+            <a:off x="1776412" y="995362"/>
+            <a:ext cx="5591175" cy="3152775"/>
+          </a:xfrm>
+          <a:prstGeom prst="rect">
+            <a:avLst/>
+          </a:prstGeom>
+        </p:spPr>
+      </p:pic>
+    </p:spTree>
+    <p:extLst>
+      <p:ext uri="{BB962C8B-B14F-4D97-AF65-F5344CB8AC3E}">
+        <p14:creationId xmlns:p14="http://schemas.microsoft.com/office/powerpoint/2010/main" val="3314728299"/>
+      </p:ext>
+    </p:extLst>
+  </p:cSld>
+  <p:clrMapOvr>
+    <a:masterClrMapping/>
+  </p:clrMapOvr>
+</p:sld>
+</file>
+
+<file path=ppt/slides/slide15.xml><?xml version="1.0" encoding="utf-8"?>
+<p:sld xmlns:a="http://schemas.openxmlformats.org/drawingml/2006/main" xmlns:r="http://schemas.openxmlformats.org/officeDocument/2006/relationships" xmlns:p="http://schemas.openxmlformats.org/presentationml/2006/main" show="0">
+  <p:cSld>
+    <p:spTree>
+      <p:nvGrpSpPr>
+        <p:cNvPr id="1" name=""/>
+        <p:cNvGrpSpPr/>
+        <p:nvPr/>
+      </p:nvGrpSpPr>
+      <p:grpSpPr>
+        <a:xfrm>
+          <a:off x="0" y="0"/>
+          <a:ext cx="0" cy="0"/>
+          <a:chOff x="0" y="0"/>
+          <a:chExt cx="0" cy="0"/>
+        </a:xfrm>
+      </p:grpSpPr>
+      <p:sp>
+        <p:nvSpPr>
+          <p:cNvPr id="2" name="Title 1">
+            <a:extLst>
+              <a:ext uri="{FF2B5EF4-FFF2-40B4-BE49-F238E27FC236}">
+                <a16:creationId xmlns:a16="http://schemas.microsoft.com/office/drawing/2014/main" id="{5D115037-DEC6-5B11-2874-4553EF8606ED}"/>
+              </a:ext>
+            </a:extLst>
+          </p:cNvPr>
+          <p:cNvSpPr>
+            <a:spLocks noGrp="1"/>
+          </p:cNvSpPr>
+          <p:nvPr>
+            <p:ph type="title"/>
+          </p:nvPr>
+        </p:nvSpPr>
+        <p:spPr/>
+        <p:txBody>
+          <a:bodyPr>
+            <a:normAutofit fontScale="90000"/>
+          </a:bodyPr>
+          <a:lstStyle/>
+          <a:p>
+            <a:r>
+              <a:rPr lang="en-US" dirty="0"/>
+              <a:t>Example file: example1.props</a:t>
+            </a:r>
+            <a:endParaRPr lang="en-NL" dirty="0"/>
+          </a:p>
+        </p:txBody>
+      </p:sp>
+      <p:sp>
+        <p:nvSpPr>
+          <p:cNvPr id="4" name="Rectangle 1">
+            <a:extLst>
+              <a:ext uri="{FF2B5EF4-FFF2-40B4-BE49-F238E27FC236}">
+                <a16:creationId xmlns:a16="http://schemas.microsoft.com/office/drawing/2014/main" id="{02765D9A-E412-A67C-B6D7-CAA9F12DAE96}"/>
+              </a:ext>
+            </a:extLst>
+          </p:cNvPr>
+          <p:cNvSpPr>
+            <a:spLocks noGrp="1" noChangeArrowheads="1"/>
+          </p:cNvSpPr>
+          <p:nvPr>
+            <p:ph type="body" idx="1"/>
+          </p:nvPr>
+        </p:nvSpPr>
+        <p:spPr bwMode="auto">
+          <a:xfrm>
+            <a:off x="1610360" y="2349789"/>
+            <a:ext cx="5883342" cy="923330"/>
+          </a:xfrm>
+          <a:prstGeom prst="rect">
+            <a:avLst/>
+          </a:prstGeom>
+          <a:solidFill>
+            <a:srgbClr val="FFFFFF"/>
+          </a:solidFill>
+          <a:ln>
+            <a:noFill/>
+          </a:ln>
+          <a:effectLst/>
+          <a:extLst>
+            <a:ext uri="{91240B29-F687-4F45-9708-019B960494DF}">
+              <a14:hiddenLine xmlns:a14="http://schemas.microsoft.com/office/drawing/2010/main" w="9525">
+                <a:solidFill>
+                  <a:schemeClr val="tx1"/>
+                </a:solidFill>
+                <a:miter lim="800000"/>
+                <a:headEnd/>
+                <a:tailEnd/>
+              </a14:hiddenLine>
+            </a:ext>
+            <a:ext uri="{AF507438-7753-43E0-B8FC-AC1667EBCBE1}">
+              <a14:hiddenEffects xmlns:a14="http://schemas.microsoft.com/office/drawing/2010/main">
+                <a:effectLst>
+                  <a:outerShdw dist="35921" dir="2700000" algn="ctr" rotWithShape="0">
+                    <a:schemeClr val="bg2"/>
+                  </a:outerShdw>
+                </a:effectLst>
+              </a14:hiddenEffects>
+            </a:ext>
+          </a:extLst>
+        </p:spPr>
+        <p:txBody>
+          <a:bodyPr vert="horz" wrap="none" lIns="91440" tIns="45720" rIns="91440" bIns="45720" numCol="1" anchor="ctr" anchorCtr="0" compatLnSpc="1">
+            <a:prstTxWarp prst="textNoShape">
+              <a:avLst/>
+            </a:prstTxWarp>
+            <a:spAutoFit/>
+          </a:bodyPr>
+          <a:lstStyle/>
+          <a:p>
+            <a:pPr marL="0" marR="0" lvl="0" indent="0" algn="l" defTabSz="914400" rtl="0" eaLnBrk="0" fontAlgn="base" latinLnBrk="0" hangingPunct="0">
+              <a:lnSpc>
+                <a:spcPct val="100000"/>
+              </a:lnSpc>
+              <a:spcBef>
+                <a:spcPct val="0"/>
+              </a:spcBef>
+              <a:spcAft>
+                <a:spcPct val="0"/>
+              </a:spcAft>
+              <a:buClrTx/>
+              <a:buSzTx/>
+              <a:buFontTx/>
+              <a:buNone/>
+              <a:tabLst/>
+            </a:pPr>
+            <a:r>
+              <a:rPr kumimoji="0" lang="en-NL" altLang="en-NL" b="0" i="0" u="none" strike="noStrike" cap="none" normalizeH="0" baseline="0">
+                <a:ln>
+                  <a:noFill/>
+                </a:ln>
+                <a:solidFill>
+                  <a:srgbClr val="080808"/>
+                </a:solidFill>
+                <a:effectLst/>
+                <a:latin typeface="Consolas" panose="020B0609020204030204" pitchFamily="49" charset="0"/>
+              </a:rPr>
+              <a:t>integerProp = 1</a:t>
+            </a:r>
+            <a:br>
+              <a:rPr kumimoji="0" lang="en-NL" altLang="en-NL" b="0" i="0" u="none" strike="noStrike" cap="none" normalizeH="0" baseline="0">
+                <a:ln>
+                  <a:noFill/>
+                </a:ln>
+                <a:solidFill>
+                  <a:srgbClr val="080808"/>
+                </a:solidFill>
+                <a:effectLst/>
+                <a:latin typeface="Consolas" panose="020B0609020204030204" pitchFamily="49" charset="0"/>
+              </a:rPr>
+            </a:br>
+            <a:r>
+              <a:rPr kumimoji="0" lang="en-NL" altLang="en-NL" b="0" i="0" u="none" strike="noStrike" cap="none" normalizeH="0" baseline="0">
+                <a:ln>
+                  <a:noFill/>
+                </a:ln>
+                <a:solidFill>
+                  <a:srgbClr val="080808"/>
+                </a:solidFill>
+                <a:effectLst/>
+                <a:latin typeface="Consolas" panose="020B0609020204030204" pitchFamily="49" charset="0"/>
+              </a:rPr>
+              <a:t>LIonWeb_integrates = true</a:t>
+            </a:r>
+            <a:br>
+              <a:rPr kumimoji="0" lang="en-NL" altLang="en-NL" b="0" i="0" u="none" strike="noStrike" cap="none" normalizeH="0" baseline="0">
+                <a:ln>
+                  <a:noFill/>
+                </a:ln>
+                <a:solidFill>
+                  <a:srgbClr val="080808"/>
+                </a:solidFill>
+                <a:effectLst/>
+                <a:latin typeface="Consolas" panose="020B0609020204030204" pitchFamily="49" charset="0"/>
+              </a:rPr>
+            </a:br>
+            <a:r>
+              <a:rPr kumimoji="0" lang="en-NL" altLang="en-NL" b="0" i="0" u="none" strike="noStrike" cap="none" normalizeH="0" baseline="0">
+                <a:ln>
+                  <a:noFill/>
+                </a:ln>
+                <a:solidFill>
+                  <a:srgbClr val="080808"/>
+                </a:solidFill>
+                <a:effectLst/>
+                <a:latin typeface="Consolas" panose="020B0609020204030204" pitchFamily="49" charset="0"/>
+              </a:rPr>
+              <a:t>myString = "Hello, StarLasu, MPS, and Freon!"</a:t>
+            </a:r>
+            <a:endParaRPr kumimoji="0" lang="en-NL" altLang="en-NL" b="0" i="0" u="none" strike="noStrike" cap="none" normalizeH="0" baseline="0">
+              <a:ln>
+                <a:noFill/>
+              </a:ln>
+              <a:solidFill>
+                <a:schemeClr val="tx1"/>
+              </a:solidFill>
+              <a:effectLst/>
+              <a:latin typeface="Consolas" panose="020B0609020204030204" pitchFamily="49" charset="0"/>
+            </a:endParaRPr>
+          </a:p>
+        </p:txBody>
+      </p:sp>
+    </p:spTree>
+    <p:extLst>
+      <p:ext uri="{BB962C8B-B14F-4D97-AF65-F5344CB8AC3E}">
+        <p14:creationId xmlns:p14="http://schemas.microsoft.com/office/powerpoint/2010/main" val="128467163"/>
+      </p:ext>
+    </p:extLst>
+  </p:cSld>
+  <p:clrMapOvr>
+    <a:masterClrMapping/>
+  </p:clrMapOvr>
+</p:sld>
+</file>
+
+<file path=ppt/slides/slide16.xml><?xml version="1.0" encoding="utf-8"?>
+<p:sld xmlns:a="http://schemas.openxmlformats.org/drawingml/2006/main" xmlns:r="http://schemas.openxmlformats.org/officeDocument/2006/relationships" xmlns:p="http://schemas.openxmlformats.org/presentationml/2006/main">
+  <p:cSld>
+    <p:spTree>
+      <p:nvGrpSpPr>
+        <p:cNvPr id="1" name=""/>
+        <p:cNvGrpSpPr/>
+        <p:nvPr/>
+      </p:nvGrpSpPr>
+      <p:grpSpPr>
+        <a:xfrm>
+          <a:off x="0" y="0"/>
+          <a:ext cx="0" cy="0"/>
+          <a:chOff x="0" y="0"/>
+          <a:chExt cx="0" cy="0"/>
+        </a:xfrm>
+      </p:grpSpPr>
+      <p:sp>
+        <p:nvSpPr>
           <p:cNvPr id="4" name="Rectangle 3">
             <a:extLst>
               <a:ext uri="{FF2B5EF4-FFF2-40B4-BE49-F238E27FC236}">
@@ -24165,7 +24486,7 @@
 </p:sld>
 </file>
 
-<file path=ppt/slides/slide15.xml><?xml version="1.0" encoding="utf-8"?>
+<file path=ppt/slides/slide17.xml><?xml version="1.0" encoding="utf-8"?>
 <p:sld xmlns:a="http://schemas.openxmlformats.org/drawingml/2006/main" xmlns:r="http://schemas.openxmlformats.org/officeDocument/2006/relationships" xmlns:p="http://schemas.openxmlformats.org/presentationml/2006/main">
   <p:cSld>
     <p:spTree>
@@ -25550,7 +25871,7 @@
 </p:sld>
 </file>
 
-<file path=ppt/slides/slide16.xml><?xml version="1.0" encoding="utf-8"?>
+<file path=ppt/slides/slide18.xml><?xml version="1.0" encoding="utf-8"?>
 <p:sld xmlns:a="http://schemas.openxmlformats.org/drawingml/2006/main" xmlns:r="http://schemas.openxmlformats.org/officeDocument/2006/relationships" xmlns:p="http://schemas.openxmlformats.org/presentationml/2006/main" show="0">
   <p:cSld>
     <p:spTree>
@@ -25751,7 +26072,7 @@
 </p:sld>
 </file>
 
-<file path=ppt/slides/slide17.xml><?xml version="1.0" encoding="utf-8"?>
+<file path=ppt/slides/slide19.xml><?xml version="1.0" encoding="utf-8"?>
 <p:sld xmlns:a="http://schemas.openxmlformats.org/drawingml/2006/main" xmlns:r="http://schemas.openxmlformats.org/officeDocument/2006/relationships" xmlns:p="http://schemas.openxmlformats.org/presentationml/2006/main">
   <p:cSld>
     <p:spTree>
@@ -27713,243 +28034,6 @@
 </p:sld>
 </file>
 
-<file path=ppt/slides/slide18.xml><?xml version="1.0" encoding="utf-8"?>
-<p:sld xmlns:a="http://schemas.openxmlformats.org/drawingml/2006/main" xmlns:r="http://schemas.openxmlformats.org/officeDocument/2006/relationships" xmlns:p="http://schemas.openxmlformats.org/presentationml/2006/main" show="0">
-  <p:cSld>
-    <p:spTree>
-      <p:nvGrpSpPr>
-        <p:cNvPr id="1" name="Shape 197"/>
-        <p:cNvGrpSpPr/>
-        <p:nvPr/>
-      </p:nvGrpSpPr>
-      <p:grpSpPr>
-        <a:xfrm>
-          <a:off x="0" y="0"/>
-          <a:ext cx="0" cy="0"/>
-          <a:chOff x="0" y="0"/>
-          <a:chExt cx="0" cy="0"/>
-        </a:xfrm>
-      </p:grpSpPr>
-      <p:sp>
-        <p:nvSpPr>
-          <p:cNvPr id="201" name="Google Shape;201;p22"/>
-          <p:cNvSpPr txBox="1"/>
-          <p:nvPr/>
-        </p:nvSpPr>
-        <p:spPr>
-          <a:xfrm>
-            <a:off x="2303575" y="720945"/>
-            <a:ext cx="6565500" cy="1262100"/>
-          </a:xfrm>
-          <a:prstGeom prst="rect">
-            <a:avLst/>
-          </a:prstGeom>
-          <a:noFill/>
-          <a:ln>
-            <a:noFill/>
-          </a:ln>
-        </p:spPr>
-        <p:txBody>
-          <a:bodyPr spcFirstLastPara="1" wrap="square" lIns="91425" tIns="91425" rIns="91425" bIns="91425" anchor="t" anchorCtr="0">
-            <a:spAutoFit/>
-          </a:bodyPr>
-          <a:lstStyle/>
-          <a:p>
-            <a:pPr marL="457200" lvl="0" indent="-307975" algn="l" rtl="0">
-              <a:lnSpc>
-                <a:spcPct val="115000"/>
-              </a:lnSpc>
-              <a:spcBef>
-                <a:spcPts val="300"/>
-              </a:spcBef>
-              <a:spcAft>
-                <a:spcPts val="0"/>
-              </a:spcAft>
-              <a:buClr>
-                <a:srgbClr val="1F2328"/>
-              </a:buClr>
-              <a:buSzPts val="1250"/>
-              <a:buChar char="●"/>
-            </a:pPr>
-            <a:r>
-              <a:rPr lang="en" sz="1250" dirty="0">
-                <a:solidFill>
-                  <a:srgbClr val="1F2328"/>
-                </a:solidFill>
-              </a:rPr>
-              <a:t>Finalize Bulk Protocols and document them</a:t>
-            </a:r>
-            <a:endParaRPr sz="1250" dirty="0">
-              <a:solidFill>
-                <a:srgbClr val="1F2328"/>
-              </a:solidFill>
-            </a:endParaRPr>
-          </a:p>
-          <a:p>
-            <a:pPr marL="457200" lvl="0" indent="-307975" algn="l" rtl="0">
-              <a:lnSpc>
-                <a:spcPct val="115000"/>
-              </a:lnSpc>
-              <a:spcBef>
-                <a:spcPts val="0"/>
-              </a:spcBef>
-              <a:spcAft>
-                <a:spcPts val="0"/>
-              </a:spcAft>
-              <a:buClr>
-                <a:srgbClr val="1F2328"/>
-              </a:buClr>
-              <a:buSzPts val="1250"/>
-              <a:buChar char="●"/>
-            </a:pPr>
-            <a:r>
-              <a:rPr lang="en" sz="1250" dirty="0">
-                <a:solidFill>
-                  <a:srgbClr val="1F2328"/>
-                </a:solidFill>
-              </a:rPr>
-              <a:t>Start Work on delta protocols / collaboration</a:t>
-            </a:r>
-            <a:endParaRPr sz="1250" dirty="0">
-              <a:solidFill>
-                <a:srgbClr val="1F2328"/>
-              </a:solidFill>
-            </a:endParaRPr>
-          </a:p>
-          <a:p>
-            <a:pPr marL="457200" lvl="0" indent="-307975" algn="l" rtl="0">
-              <a:lnSpc>
-                <a:spcPct val="115000"/>
-              </a:lnSpc>
-              <a:spcBef>
-                <a:spcPts val="0"/>
-              </a:spcBef>
-              <a:spcAft>
-                <a:spcPts val="0"/>
-              </a:spcAft>
-              <a:buClr>
-                <a:srgbClr val="1F2328"/>
-              </a:buClr>
-              <a:buSzPts val="1250"/>
-              <a:buChar char="●"/>
-            </a:pPr>
-            <a:r>
-              <a:rPr lang="en" sz="1250" dirty="0">
-                <a:solidFill>
-                  <a:srgbClr val="1F2328"/>
-                </a:solidFill>
-              </a:rPr>
-              <a:t>Refine meta-metamodel</a:t>
-            </a:r>
-            <a:endParaRPr sz="1250" dirty="0">
-              <a:solidFill>
-                <a:srgbClr val="1F2328"/>
-              </a:solidFill>
-            </a:endParaRPr>
-          </a:p>
-          <a:p>
-            <a:pPr marL="457200" lvl="0" indent="-307975" algn="l" rtl="0">
-              <a:lnSpc>
-                <a:spcPct val="115000"/>
-              </a:lnSpc>
-              <a:spcBef>
-                <a:spcPts val="0"/>
-              </a:spcBef>
-              <a:spcAft>
-                <a:spcPts val="0"/>
-              </a:spcAft>
-              <a:buClr>
-                <a:srgbClr val="1F2328"/>
-              </a:buClr>
-              <a:buSzPts val="1250"/>
-              <a:buChar char="●"/>
-            </a:pPr>
-            <a:r>
-              <a:rPr lang="en" sz="1250" dirty="0">
-                <a:solidFill>
-                  <a:srgbClr val="1F2328"/>
-                </a:solidFill>
-              </a:rPr>
-              <a:t>Improve reference implementations and examples</a:t>
-            </a:r>
-            <a:endParaRPr sz="1250" dirty="0">
-              <a:solidFill>
-                <a:srgbClr val="1F2328"/>
-              </a:solidFill>
-            </a:endParaRPr>
-          </a:p>
-          <a:p>
-            <a:pPr marL="457200" lvl="0" indent="-307975" algn="l" rtl="0">
-              <a:lnSpc>
-                <a:spcPct val="115000"/>
-              </a:lnSpc>
-              <a:spcBef>
-                <a:spcPts val="0"/>
-              </a:spcBef>
-              <a:spcAft>
-                <a:spcPts val="0"/>
-              </a:spcAft>
-              <a:buClr>
-                <a:srgbClr val="1F2328"/>
-              </a:buClr>
-              <a:buSzPts val="1250"/>
-              <a:buChar char="●"/>
-            </a:pPr>
-            <a:r>
-              <a:rPr lang="en" sz="1250" dirty="0">
-                <a:solidFill>
-                  <a:srgbClr val="1F2328"/>
-                </a:solidFill>
-              </a:rPr>
-              <a:t>Support integration with more tools</a:t>
-            </a:r>
-            <a:endParaRPr sz="1250" dirty="0">
-              <a:solidFill>
-                <a:srgbClr val="1F2328"/>
-              </a:solidFill>
-            </a:endParaRPr>
-          </a:p>
-        </p:txBody>
-      </p:sp>
-      <p:sp>
-        <p:nvSpPr>
-          <p:cNvPr id="4" name="Title 3">
-            <a:extLst>
-              <a:ext uri="{FF2B5EF4-FFF2-40B4-BE49-F238E27FC236}">
-                <a16:creationId xmlns:a16="http://schemas.microsoft.com/office/drawing/2014/main" id="{AC23366B-B33E-99DC-30CA-1E5BB327A54F}"/>
-              </a:ext>
-            </a:extLst>
-          </p:cNvPr>
-          <p:cNvSpPr>
-            <a:spLocks noGrp="1"/>
-          </p:cNvSpPr>
-          <p:nvPr>
-            <p:ph type="title"/>
-          </p:nvPr>
-        </p:nvSpPr>
-        <p:spPr/>
-        <p:txBody>
-          <a:bodyPr>
-            <a:normAutofit fontScale="90000"/>
-          </a:bodyPr>
-          <a:lstStyle/>
-          <a:p>
-            <a:r>
-              <a:rPr lang="en-US" sz="2800" b="1"/>
-              <a:t>Near Term Focus</a:t>
-            </a:r>
-            <a:endParaRPr lang="en-US" dirty="0"/>
-          </a:p>
-        </p:txBody>
-      </p:sp>
-    </p:spTree>
-  </p:cSld>
-  <p:clrMapOvr>
-    <a:masterClrMapping/>
-  </p:clrMapOvr>
-</p:sld>
-</file>
-
 <file path=ppt/slides/slide2.xml><?xml version="1.0" encoding="utf-8"?>
 <p:sld xmlns:a="http://schemas.openxmlformats.org/drawingml/2006/main" xmlns:r="http://schemas.openxmlformats.org/officeDocument/2006/relationships" xmlns:p="http://schemas.openxmlformats.org/presentationml/2006/main">
   <p:cSld>
@@ -28006,6 +28090,243 @@
         <p14:creationId xmlns:p14="http://schemas.microsoft.com/office/powerpoint/2010/main" val="3239961873"/>
       </p:ext>
     </p:extLst>
+  </p:cSld>
+  <p:clrMapOvr>
+    <a:masterClrMapping/>
+  </p:clrMapOvr>
+</p:sld>
+</file>
+
+<file path=ppt/slides/slide20.xml><?xml version="1.0" encoding="utf-8"?>
+<p:sld xmlns:a="http://schemas.openxmlformats.org/drawingml/2006/main" xmlns:r="http://schemas.openxmlformats.org/officeDocument/2006/relationships" xmlns:p="http://schemas.openxmlformats.org/presentationml/2006/main" show="0">
+  <p:cSld>
+    <p:spTree>
+      <p:nvGrpSpPr>
+        <p:cNvPr id="1" name="Shape 197"/>
+        <p:cNvGrpSpPr/>
+        <p:nvPr/>
+      </p:nvGrpSpPr>
+      <p:grpSpPr>
+        <a:xfrm>
+          <a:off x="0" y="0"/>
+          <a:ext cx="0" cy="0"/>
+          <a:chOff x="0" y="0"/>
+          <a:chExt cx="0" cy="0"/>
+        </a:xfrm>
+      </p:grpSpPr>
+      <p:sp>
+        <p:nvSpPr>
+          <p:cNvPr id="201" name="Google Shape;201;p22"/>
+          <p:cNvSpPr txBox="1"/>
+          <p:nvPr/>
+        </p:nvSpPr>
+        <p:spPr>
+          <a:xfrm>
+            <a:off x="2303575" y="720945"/>
+            <a:ext cx="6565500" cy="1262100"/>
+          </a:xfrm>
+          <a:prstGeom prst="rect">
+            <a:avLst/>
+          </a:prstGeom>
+          <a:noFill/>
+          <a:ln>
+            <a:noFill/>
+          </a:ln>
+        </p:spPr>
+        <p:txBody>
+          <a:bodyPr spcFirstLastPara="1" wrap="square" lIns="91425" tIns="91425" rIns="91425" bIns="91425" anchor="t" anchorCtr="0">
+            <a:spAutoFit/>
+          </a:bodyPr>
+          <a:lstStyle/>
+          <a:p>
+            <a:pPr marL="457200" lvl="0" indent="-307975" algn="l" rtl="0">
+              <a:lnSpc>
+                <a:spcPct val="115000"/>
+              </a:lnSpc>
+              <a:spcBef>
+                <a:spcPts val="300"/>
+              </a:spcBef>
+              <a:spcAft>
+                <a:spcPts val="0"/>
+              </a:spcAft>
+              <a:buClr>
+                <a:srgbClr val="1F2328"/>
+              </a:buClr>
+              <a:buSzPts val="1250"/>
+              <a:buChar char="●"/>
+            </a:pPr>
+            <a:r>
+              <a:rPr lang="en" sz="1250" dirty="0">
+                <a:solidFill>
+                  <a:srgbClr val="1F2328"/>
+                </a:solidFill>
+              </a:rPr>
+              <a:t>Finalize Bulk Protocols and document them</a:t>
+            </a:r>
+            <a:endParaRPr sz="1250" dirty="0">
+              <a:solidFill>
+                <a:srgbClr val="1F2328"/>
+              </a:solidFill>
+            </a:endParaRPr>
+          </a:p>
+          <a:p>
+            <a:pPr marL="457200" lvl="0" indent="-307975" algn="l" rtl="0">
+              <a:lnSpc>
+                <a:spcPct val="115000"/>
+              </a:lnSpc>
+              <a:spcBef>
+                <a:spcPts val="0"/>
+              </a:spcBef>
+              <a:spcAft>
+                <a:spcPts val="0"/>
+              </a:spcAft>
+              <a:buClr>
+                <a:srgbClr val="1F2328"/>
+              </a:buClr>
+              <a:buSzPts val="1250"/>
+              <a:buChar char="●"/>
+            </a:pPr>
+            <a:r>
+              <a:rPr lang="en" sz="1250" dirty="0">
+                <a:solidFill>
+                  <a:srgbClr val="1F2328"/>
+                </a:solidFill>
+              </a:rPr>
+              <a:t>Start Work on delta protocols / collaboration</a:t>
+            </a:r>
+            <a:endParaRPr sz="1250" dirty="0">
+              <a:solidFill>
+                <a:srgbClr val="1F2328"/>
+              </a:solidFill>
+            </a:endParaRPr>
+          </a:p>
+          <a:p>
+            <a:pPr marL="457200" lvl="0" indent="-307975" algn="l" rtl="0">
+              <a:lnSpc>
+                <a:spcPct val="115000"/>
+              </a:lnSpc>
+              <a:spcBef>
+                <a:spcPts val="0"/>
+              </a:spcBef>
+              <a:spcAft>
+                <a:spcPts val="0"/>
+              </a:spcAft>
+              <a:buClr>
+                <a:srgbClr val="1F2328"/>
+              </a:buClr>
+              <a:buSzPts val="1250"/>
+              <a:buChar char="●"/>
+            </a:pPr>
+            <a:r>
+              <a:rPr lang="en" sz="1250" dirty="0">
+                <a:solidFill>
+                  <a:srgbClr val="1F2328"/>
+                </a:solidFill>
+              </a:rPr>
+              <a:t>Refine meta-metamodel</a:t>
+            </a:r>
+            <a:endParaRPr sz="1250" dirty="0">
+              <a:solidFill>
+                <a:srgbClr val="1F2328"/>
+              </a:solidFill>
+            </a:endParaRPr>
+          </a:p>
+          <a:p>
+            <a:pPr marL="457200" lvl="0" indent="-307975" algn="l" rtl="0">
+              <a:lnSpc>
+                <a:spcPct val="115000"/>
+              </a:lnSpc>
+              <a:spcBef>
+                <a:spcPts val="0"/>
+              </a:spcBef>
+              <a:spcAft>
+                <a:spcPts val="0"/>
+              </a:spcAft>
+              <a:buClr>
+                <a:srgbClr val="1F2328"/>
+              </a:buClr>
+              <a:buSzPts val="1250"/>
+              <a:buChar char="●"/>
+            </a:pPr>
+            <a:r>
+              <a:rPr lang="en" sz="1250" dirty="0">
+                <a:solidFill>
+                  <a:srgbClr val="1F2328"/>
+                </a:solidFill>
+              </a:rPr>
+              <a:t>Improve reference implementations and examples</a:t>
+            </a:r>
+            <a:endParaRPr sz="1250" dirty="0">
+              <a:solidFill>
+                <a:srgbClr val="1F2328"/>
+              </a:solidFill>
+            </a:endParaRPr>
+          </a:p>
+          <a:p>
+            <a:pPr marL="457200" lvl="0" indent="-307975" algn="l" rtl="0">
+              <a:lnSpc>
+                <a:spcPct val="115000"/>
+              </a:lnSpc>
+              <a:spcBef>
+                <a:spcPts val="0"/>
+              </a:spcBef>
+              <a:spcAft>
+                <a:spcPts val="0"/>
+              </a:spcAft>
+              <a:buClr>
+                <a:srgbClr val="1F2328"/>
+              </a:buClr>
+              <a:buSzPts val="1250"/>
+              <a:buChar char="●"/>
+            </a:pPr>
+            <a:r>
+              <a:rPr lang="en" sz="1250" dirty="0">
+                <a:solidFill>
+                  <a:srgbClr val="1F2328"/>
+                </a:solidFill>
+              </a:rPr>
+              <a:t>Support integration with more tools</a:t>
+            </a:r>
+            <a:endParaRPr sz="1250" dirty="0">
+              <a:solidFill>
+                <a:srgbClr val="1F2328"/>
+              </a:solidFill>
+            </a:endParaRPr>
+          </a:p>
+        </p:txBody>
+      </p:sp>
+      <p:sp>
+        <p:nvSpPr>
+          <p:cNvPr id="4" name="Title 3">
+            <a:extLst>
+              <a:ext uri="{FF2B5EF4-FFF2-40B4-BE49-F238E27FC236}">
+                <a16:creationId xmlns:a16="http://schemas.microsoft.com/office/drawing/2014/main" id="{AC23366B-B33E-99DC-30CA-1E5BB327A54F}"/>
+              </a:ext>
+            </a:extLst>
+          </p:cNvPr>
+          <p:cNvSpPr>
+            <a:spLocks noGrp="1"/>
+          </p:cNvSpPr>
+          <p:nvPr>
+            <p:ph type="title"/>
+          </p:nvPr>
+        </p:nvSpPr>
+        <p:spPr/>
+        <p:txBody>
+          <a:bodyPr>
+            <a:normAutofit fontScale="90000"/>
+          </a:bodyPr>
+          <a:lstStyle/>
+          <a:p>
+            <a:r>
+              <a:rPr lang="en-US" sz="2800" b="1"/>
+              <a:t>Near Term Focus</a:t>
+            </a:r>
+            <a:endParaRPr lang="en-US" dirty="0"/>
+          </a:p>
+        </p:txBody>
+      </p:sp>
+    </p:spTree>
   </p:cSld>
   <p:clrMapOvr>
     <a:masterClrMapping/>

</xml_diff>